<commit_message>
final printed pdf cpy added and doctors database.sql added
</commit_message>
<xml_diff>
--- a/AppointmentSystem.pptx
+++ b/AppointmentSystem.pptx
@@ -5,10 +5,10 @@
     <p:sldMasterId id="2147484223" r:id="rId1"/>
   </p:sldMasterIdLst>
   <p:notesMasterIdLst>
-    <p:notesMasterId r:id="rId27"/>
+    <p:notesMasterId r:id="rId28"/>
   </p:notesMasterIdLst>
   <p:handoutMasterIdLst>
-    <p:handoutMasterId r:id="rId28"/>
+    <p:handoutMasterId r:id="rId29"/>
   </p:handoutMasterIdLst>
   <p:sldIdLst>
     <p:sldId id="275" r:id="rId2"/>
@@ -29,13 +29,14 @@
     <p:sldId id="290" r:id="rId17"/>
     <p:sldId id="291" r:id="rId18"/>
     <p:sldId id="292" r:id="rId19"/>
-    <p:sldId id="294" r:id="rId20"/>
-    <p:sldId id="295" r:id="rId21"/>
-    <p:sldId id="297" r:id="rId22"/>
-    <p:sldId id="299" r:id="rId23"/>
-    <p:sldId id="296" r:id="rId24"/>
-    <p:sldId id="300" r:id="rId25"/>
-    <p:sldId id="278" r:id="rId26"/>
+    <p:sldId id="301" r:id="rId20"/>
+    <p:sldId id="294" r:id="rId21"/>
+    <p:sldId id="295" r:id="rId22"/>
+    <p:sldId id="297" r:id="rId23"/>
+    <p:sldId id="299" r:id="rId24"/>
+    <p:sldId id="296" r:id="rId25"/>
+    <p:sldId id="300" r:id="rId26"/>
+    <p:sldId id="278" r:id="rId27"/>
   </p:sldIdLst>
   <p:sldSz cx="12192000" cy="6858000"/>
   <p:notesSz cx="6858000" cy="9144000"/>
@@ -157,6 +158,7 @@
             <p14:sldId id="290"/>
             <p14:sldId id="291"/>
             <p14:sldId id="292"/>
+            <p14:sldId id="301"/>
             <p14:sldId id="294"/>
             <p14:sldId id="295"/>
             <p14:sldId id="297"/>
@@ -3285,16 +3287,6 @@
         <a:bodyPr/>
         <a:lstStyle/>
         <a:p>
-          <a:r>
-            <a:rPr lang="en-US" b="1" dirty="0" smtClean="0">
-              <a:solidFill>
-                <a:schemeClr val="tx2">
-                  <a:lumMod val="50000"/>
-                </a:schemeClr>
-              </a:solidFill>
-            </a:rPr>
-            <a:t>Rezaul Alam Oni</a:t>
-          </a:r>
           <a:endParaRPr lang="en-US" b="1" dirty="0">
             <a:solidFill>
               <a:schemeClr val="tx2">
@@ -3323,67 +3315,6 @@
       </dgm:t>
     </dgm:pt>
     <dgm:pt modelId="{4840874E-26A7-4097-BD4A-C9F95C1F95B1}" type="sibTrans" cxnId="{15B47267-2A81-4D7E-9692-94879199ED57}">
-      <dgm:prSet/>
-      <dgm:spPr/>
-      <dgm:t>
-        <a:bodyPr/>
-        <a:lstStyle/>
-        <a:p>
-          <a:endParaRPr lang="en-US">
-            <a:solidFill>
-              <a:schemeClr val="tx2">
-                <a:lumMod val="50000"/>
-              </a:schemeClr>
-            </a:solidFill>
-          </a:endParaRPr>
-        </a:p>
-      </dgm:t>
-    </dgm:pt>
-    <dgm:pt modelId="{1D633E1E-E983-493C-98AD-81E3EC8F26F4}">
-      <dgm:prSet phldrT="[Text]"/>
-      <dgm:spPr/>
-      <dgm:t>
-        <a:bodyPr/>
-        <a:lstStyle/>
-        <a:p>
-          <a:r>
-            <a:rPr lang="en-US" dirty="0" smtClean="0">
-              <a:solidFill>
-                <a:schemeClr val="tx2">
-                  <a:lumMod val="50000"/>
-                </a:schemeClr>
-              </a:solidFill>
-            </a:rPr>
-            <a:t>Reg. No 	: 13502000498</a:t>
-          </a:r>
-          <a:endParaRPr lang="en-US" dirty="0">
-            <a:solidFill>
-              <a:schemeClr val="tx2">
-                <a:lumMod val="50000"/>
-              </a:schemeClr>
-            </a:solidFill>
-          </a:endParaRPr>
-        </a:p>
-      </dgm:t>
-    </dgm:pt>
-    <dgm:pt modelId="{85986096-C8F6-4726-AF6B-E169AC37036D}" type="parTrans" cxnId="{B0941172-7BA1-4590-A17C-61CB406B77C1}">
-      <dgm:prSet/>
-      <dgm:spPr/>
-      <dgm:t>
-        <a:bodyPr/>
-        <a:lstStyle/>
-        <a:p>
-          <a:endParaRPr lang="en-US">
-            <a:solidFill>
-              <a:schemeClr val="tx2">
-                <a:lumMod val="50000"/>
-              </a:schemeClr>
-            </a:solidFill>
-          </a:endParaRPr>
-        </a:p>
-      </dgm:t>
-    </dgm:pt>
-    <dgm:pt modelId="{F0F7FD9A-C3DE-4E69-BA90-B2E5C21A6451}" type="sibTrans" cxnId="{B0941172-7BA1-4590-A17C-61CB406B77C1}">
       <dgm:prSet/>
       <dgm:spPr/>
       <dgm:t>
@@ -3468,46 +3399,6 @@
         <a:bodyPr/>
         <a:lstStyle/>
         <a:p>
-          <a:r>
-            <a:rPr lang="en-US" b="1" dirty="0" smtClean="0">
-              <a:solidFill>
-                <a:schemeClr val="tx2">
-                  <a:lumMod val="50000"/>
-                </a:schemeClr>
-              </a:solidFill>
-            </a:rPr>
-            <a:t>Sheikh </a:t>
-          </a:r>
-          <a:r>
-            <a:rPr lang="en-US" b="1" dirty="0" err="1" smtClean="0">
-              <a:solidFill>
-                <a:schemeClr val="tx2">
-                  <a:lumMod val="50000"/>
-                </a:schemeClr>
-              </a:solidFill>
-            </a:rPr>
-            <a:t>Hafiza</a:t>
-          </a:r>
-          <a:r>
-            <a:rPr lang="en-US" b="1" dirty="0" smtClean="0">
-              <a:solidFill>
-                <a:schemeClr val="tx2">
-                  <a:lumMod val="50000"/>
-                </a:schemeClr>
-              </a:solidFill>
-            </a:rPr>
-            <a:t> </a:t>
-          </a:r>
-          <a:r>
-            <a:rPr lang="en-US" b="1" dirty="0" err="1" smtClean="0">
-              <a:solidFill>
-                <a:schemeClr val="tx2">
-                  <a:lumMod val="50000"/>
-                </a:schemeClr>
-              </a:solidFill>
-            </a:rPr>
-            <a:t>Bani</a:t>
-          </a:r>
           <a:endParaRPr lang="en-US" b="1" dirty="0">
             <a:solidFill>
               <a:schemeClr val="tx2">
@@ -3536,67 +3427,6 @@
       </dgm:t>
     </dgm:pt>
     <dgm:pt modelId="{28319B62-8FAD-4E7F-B68E-3AEBA8A04CD1}" type="sibTrans" cxnId="{DA42C543-3BF0-45E6-8CB7-50126BC94110}">
-      <dgm:prSet/>
-      <dgm:spPr/>
-      <dgm:t>
-        <a:bodyPr/>
-        <a:lstStyle/>
-        <a:p>
-          <a:endParaRPr lang="en-US">
-            <a:solidFill>
-              <a:schemeClr val="tx2">
-                <a:lumMod val="50000"/>
-              </a:schemeClr>
-            </a:solidFill>
-          </a:endParaRPr>
-        </a:p>
-      </dgm:t>
-    </dgm:pt>
-    <dgm:pt modelId="{95EFB345-242C-4AF8-ADA2-459101E20EF8}">
-      <dgm:prSet phldrT="[Text]"/>
-      <dgm:spPr/>
-      <dgm:t>
-        <a:bodyPr/>
-        <a:lstStyle/>
-        <a:p>
-          <a:r>
-            <a:rPr lang="en-US" dirty="0" smtClean="0">
-              <a:solidFill>
-                <a:schemeClr val="tx2">
-                  <a:lumMod val="50000"/>
-                </a:schemeClr>
-              </a:solidFill>
-            </a:rPr>
-            <a:t>Reg. No	: 13502000464</a:t>
-          </a:r>
-          <a:endParaRPr lang="en-US" dirty="0">
-            <a:solidFill>
-              <a:schemeClr val="tx2">
-                <a:lumMod val="50000"/>
-              </a:schemeClr>
-            </a:solidFill>
-          </a:endParaRPr>
-        </a:p>
-      </dgm:t>
-    </dgm:pt>
-    <dgm:pt modelId="{7192E5F6-F3A8-404A-B89F-18BF489E39A5}" type="parTrans" cxnId="{4E553267-6D41-450D-8169-C6ECBDEF869B}">
-      <dgm:prSet/>
-      <dgm:spPr/>
-      <dgm:t>
-        <a:bodyPr/>
-        <a:lstStyle/>
-        <a:p>
-          <a:endParaRPr lang="en-US">
-            <a:solidFill>
-              <a:schemeClr val="tx2">
-                <a:lumMod val="50000"/>
-              </a:schemeClr>
-            </a:solidFill>
-          </a:endParaRPr>
-        </a:p>
-      </dgm:t>
-    </dgm:pt>
-    <dgm:pt modelId="{8D979D1C-E076-4357-A61D-AC844E99CAD3}" type="sibTrans" cxnId="{4E553267-6D41-450D-8169-C6ECBDEF869B}">
       <dgm:prSet/>
       <dgm:spPr/>
       <dgm:t>
@@ -3780,6 +3610,128 @@
       </dgm:t>
     </dgm:pt>
     <dgm:pt modelId="{DF5AF7E9-B8B0-41B3-B568-347A929A7C35}" type="sibTrans" cxnId="{EF3AE236-017E-4316-B065-C5A5264F563B}">
+      <dgm:prSet/>
+      <dgm:spPr/>
+      <dgm:t>
+        <a:bodyPr/>
+        <a:lstStyle/>
+        <a:p>
+          <a:endParaRPr lang="en-US">
+            <a:solidFill>
+              <a:schemeClr val="tx2">
+                <a:lumMod val="50000"/>
+              </a:schemeClr>
+            </a:solidFill>
+          </a:endParaRPr>
+        </a:p>
+      </dgm:t>
+    </dgm:pt>
+    <dgm:pt modelId="{1D633E1E-E983-493C-98AD-81E3EC8F26F4}">
+      <dgm:prSet phldrT="[Text]"/>
+      <dgm:spPr/>
+      <dgm:t>
+        <a:bodyPr/>
+        <a:lstStyle/>
+        <a:p>
+          <a:r>
+            <a:rPr lang="en-US" dirty="0" smtClean="0">
+              <a:solidFill>
+                <a:schemeClr val="tx2">
+                  <a:lumMod val="50000"/>
+                </a:schemeClr>
+              </a:solidFill>
+            </a:rPr>
+            <a:t>Reg. No 	: 13502000498</a:t>
+          </a:r>
+          <a:endParaRPr lang="en-US" dirty="0">
+            <a:solidFill>
+              <a:schemeClr val="tx2">
+                <a:lumMod val="50000"/>
+              </a:schemeClr>
+            </a:solidFill>
+          </a:endParaRPr>
+        </a:p>
+      </dgm:t>
+    </dgm:pt>
+    <dgm:pt modelId="{F0F7FD9A-C3DE-4E69-BA90-B2E5C21A6451}" type="sibTrans" cxnId="{B0941172-7BA1-4590-A17C-61CB406B77C1}">
+      <dgm:prSet/>
+      <dgm:spPr/>
+      <dgm:t>
+        <a:bodyPr/>
+        <a:lstStyle/>
+        <a:p>
+          <a:endParaRPr lang="en-US">
+            <a:solidFill>
+              <a:schemeClr val="tx2">
+                <a:lumMod val="50000"/>
+              </a:schemeClr>
+            </a:solidFill>
+          </a:endParaRPr>
+        </a:p>
+      </dgm:t>
+    </dgm:pt>
+    <dgm:pt modelId="{85986096-C8F6-4726-AF6B-E169AC37036D}" type="parTrans" cxnId="{B0941172-7BA1-4590-A17C-61CB406B77C1}">
+      <dgm:prSet/>
+      <dgm:spPr/>
+      <dgm:t>
+        <a:bodyPr/>
+        <a:lstStyle/>
+        <a:p>
+          <a:endParaRPr lang="en-US">
+            <a:solidFill>
+              <a:schemeClr val="tx2">
+                <a:lumMod val="50000"/>
+              </a:schemeClr>
+            </a:solidFill>
+          </a:endParaRPr>
+        </a:p>
+      </dgm:t>
+    </dgm:pt>
+    <dgm:pt modelId="{95EFB345-242C-4AF8-ADA2-459101E20EF8}">
+      <dgm:prSet phldrT="[Text]"/>
+      <dgm:spPr/>
+      <dgm:t>
+        <a:bodyPr/>
+        <a:lstStyle/>
+        <a:p>
+          <a:r>
+            <a:rPr lang="en-US" dirty="0" smtClean="0">
+              <a:solidFill>
+                <a:schemeClr val="tx2">
+                  <a:lumMod val="50000"/>
+                </a:schemeClr>
+              </a:solidFill>
+            </a:rPr>
+            <a:t>Reg. No	: 13502000464</a:t>
+          </a:r>
+          <a:endParaRPr lang="en-US" dirty="0">
+            <a:solidFill>
+              <a:schemeClr val="tx2">
+                <a:lumMod val="50000"/>
+              </a:schemeClr>
+            </a:solidFill>
+          </a:endParaRPr>
+        </a:p>
+      </dgm:t>
+    </dgm:pt>
+    <dgm:pt modelId="{8D979D1C-E076-4357-A61D-AC844E99CAD3}" type="sibTrans" cxnId="{4E553267-6D41-450D-8169-C6ECBDEF869B}">
+      <dgm:prSet/>
+      <dgm:spPr/>
+      <dgm:t>
+        <a:bodyPr/>
+        <a:lstStyle/>
+        <a:p>
+          <a:endParaRPr lang="en-US">
+            <a:solidFill>
+              <a:schemeClr val="tx2">
+                <a:lumMod val="50000"/>
+              </a:schemeClr>
+            </a:solidFill>
+          </a:endParaRPr>
+        </a:p>
+      </dgm:t>
+    </dgm:pt>
+    <dgm:pt modelId="{7192E5F6-F3A8-404A-B89F-18BF489E39A5}" type="parTrans" cxnId="{4E553267-6D41-450D-8169-C6ECBDEF869B}">
       <dgm:prSet/>
       <dgm:spPr/>
       <dgm:t>
@@ -5468,16 +5420,6 @@
               <a:spcPct val="35000"/>
             </a:spcAft>
           </a:pPr>
-          <a:r>
-            <a:rPr lang="en-US" sz="2600" b="1" kern="1200" dirty="0" smtClean="0">
-              <a:solidFill>
-                <a:schemeClr val="tx2">
-                  <a:lumMod val="50000"/>
-                </a:schemeClr>
-              </a:solidFill>
-            </a:rPr>
-            <a:t>Rezaul Alam Oni</a:t>
-          </a:r>
           <a:endParaRPr lang="en-US" sz="2600" b="1" kern="1200" dirty="0">
             <a:solidFill>
               <a:schemeClr val="tx2">
@@ -5680,46 +5622,6 @@
               <a:spcPct val="35000"/>
             </a:spcAft>
           </a:pPr>
-          <a:r>
-            <a:rPr lang="en-US" sz="2600" b="1" kern="1200" dirty="0" smtClean="0">
-              <a:solidFill>
-                <a:schemeClr val="tx2">
-                  <a:lumMod val="50000"/>
-                </a:schemeClr>
-              </a:solidFill>
-            </a:rPr>
-            <a:t>Sheikh </a:t>
-          </a:r>
-          <a:r>
-            <a:rPr lang="en-US" sz="2600" b="1" kern="1200" dirty="0" err="1" smtClean="0">
-              <a:solidFill>
-                <a:schemeClr val="tx2">
-                  <a:lumMod val="50000"/>
-                </a:schemeClr>
-              </a:solidFill>
-            </a:rPr>
-            <a:t>Hafiza</a:t>
-          </a:r>
-          <a:r>
-            <a:rPr lang="en-US" sz="2600" b="1" kern="1200" dirty="0" smtClean="0">
-              <a:solidFill>
-                <a:schemeClr val="tx2">
-                  <a:lumMod val="50000"/>
-                </a:schemeClr>
-              </a:solidFill>
-            </a:rPr>
-            <a:t> </a:t>
-          </a:r>
-          <a:r>
-            <a:rPr lang="en-US" sz="2600" b="1" kern="1200" dirty="0" err="1" smtClean="0">
-              <a:solidFill>
-                <a:schemeClr val="tx2">
-                  <a:lumMod val="50000"/>
-                </a:schemeClr>
-              </a:solidFill>
-            </a:rPr>
-            <a:t>Bani</a:t>
-          </a:r>
           <a:endParaRPr lang="en-US" sz="2600" b="1" kern="1200" dirty="0">
             <a:solidFill>
               <a:schemeClr val="tx2">
@@ -12894,7 +12796,7 @@
           <a:p>
             <a:fld id="{1903D2E6-90E9-4C1E-8D2C-09FDD67DF24E}" type="datetimeFigureOut">
               <a:rPr lang="en-US" smtClean="0"/>
-              <a:t>9/24/2018</a:t>
+              <a:t>10/3/2018</a:t>
             </a:fld>
             <a:endParaRPr lang="en-US"/>
           </a:p>
@@ -13059,7 +12961,7 @@
           <a:p>
             <a:fld id="{99B6A5DE-4519-49E8-8E53-ED60557F7BC8}" type="datetimeFigureOut">
               <a:rPr lang="en-US" smtClean="0"/>
-              <a:t>9/24/2018</a:t>
+              <a:t>10/3/2018</a:t>
             </a:fld>
             <a:endParaRPr lang="en-US"/>
           </a:p>
@@ -13547,7 +13449,7 @@
           <a:p>
             <a:fld id="{0C14835E-303F-459C-BC65-145C3C30866C}" type="datetime1">
               <a:rPr lang="en-US" smtClean="0"/>
-              <a:t>9/24/2018</a:t>
+              <a:t>10/3/2018</a:t>
             </a:fld>
             <a:endParaRPr lang="en-US"/>
           </a:p>
@@ -13732,7 +13634,7 @@
           <a:p>
             <a:fld id="{3FFE7F95-A669-4F9F-A2E7-9D731A7C1B38}" type="datetime1">
               <a:rPr lang="en-US" smtClean="0"/>
-              <a:t>9/24/2018</a:t>
+              <a:t>10/3/2018</a:t>
             </a:fld>
             <a:endParaRPr lang="en-US"/>
           </a:p>
@@ -13920,7 +13822,7 @@
           <a:p>
             <a:fld id="{3FFE7F95-A669-4F9F-A2E7-9D731A7C1B38}" type="datetime1">
               <a:rPr lang="en-US" smtClean="0"/>
-              <a:t>9/24/2018</a:t>
+              <a:t>10/3/2018</a:t>
             </a:fld>
             <a:endParaRPr lang="en-US"/>
           </a:p>
@@ -14098,7 +14000,7 @@
           <a:p>
             <a:fld id="{3FFE7F95-A669-4F9F-A2E7-9D731A7C1B38}" type="datetime1">
               <a:rPr lang="en-US" smtClean="0"/>
-              <a:t>9/24/2018</a:t>
+              <a:t>10/3/2018</a:t>
             </a:fld>
             <a:endParaRPr lang="en-US"/>
           </a:p>
@@ -14352,7 +14254,7 @@
           <a:p>
             <a:fld id="{08F70EB8-2FE7-4990-B349-1DEDBA1E9B98}" type="datetime1">
               <a:rPr lang="en-US" smtClean="0"/>
-              <a:t>9/24/2018</a:t>
+              <a:t>10/3/2018</a:t>
             </a:fld>
             <a:endParaRPr lang="en-US"/>
           </a:p>
@@ -14594,7 +14496,7 @@
           <a:p>
             <a:fld id="{3FFE7F95-A669-4F9F-A2E7-9D731A7C1B38}" type="datetime1">
               <a:rPr lang="en-US" smtClean="0"/>
-              <a:t>9/24/2018</a:t>
+              <a:t>10/3/2018</a:t>
             </a:fld>
             <a:endParaRPr lang="en-US"/>
           </a:p>
@@ -14969,7 +14871,7 @@
           <a:p>
             <a:fld id="{3FFE7F95-A669-4F9F-A2E7-9D731A7C1B38}" type="datetime1">
               <a:rPr lang="en-US" smtClean="0"/>
-              <a:t>9/24/2018</a:t>
+              <a:t>10/3/2018</a:t>
             </a:fld>
             <a:endParaRPr lang="en-US"/>
           </a:p>
@@ -15095,7 +14997,7 @@
           <a:p>
             <a:fld id="{1F507480-5BD6-4787-B240-F5A4CF87D70F}" type="datetime1">
               <a:rPr lang="en-US" smtClean="0"/>
-              <a:t>9/24/2018</a:t>
+              <a:t>10/3/2018</a:t>
             </a:fld>
             <a:endParaRPr lang="en-US"/>
           </a:p>
@@ -15200,7 +15102,7 @@
           <a:p>
             <a:fld id="{0E51A436-DA71-401E-A9B1-6F9D660F239A}" type="datetime1">
               <a:rPr lang="en-US" smtClean="0"/>
-              <a:t>9/24/2018</a:t>
+              <a:t>10/3/2018</a:t>
             </a:fld>
             <a:endParaRPr lang="en-US"/>
           </a:p>
@@ -15492,7 +15394,7 @@
           <a:p>
             <a:fld id="{3FFE7F95-A669-4F9F-A2E7-9D731A7C1B38}" type="datetime1">
               <a:rPr lang="en-US" smtClean="0"/>
-              <a:t>9/24/2018</a:t>
+              <a:t>10/3/2018</a:t>
             </a:fld>
             <a:endParaRPr lang="en-US"/>
           </a:p>
@@ -15757,7 +15659,7 @@
           <a:p>
             <a:fld id="{D6550592-60A0-40DE-BEF2-D850CCF7BB85}" type="datetime1">
               <a:rPr lang="en-US" smtClean="0"/>
-              <a:t>9/24/2018</a:t>
+              <a:t>10/3/2018</a:t>
             </a:fld>
             <a:endParaRPr lang="en-US"/>
           </a:p>
@@ -15980,7 +15882,7 @@
           <a:p>
             <a:fld id="{3FFE7F95-A669-4F9F-A2E7-9D731A7C1B38}" type="datetime1">
               <a:rPr lang="en-US" smtClean="0"/>
-              <a:t>9/24/2018</a:t>
+              <a:t>10/3/2018</a:t>
             </a:fld>
             <a:endParaRPr lang="en-US"/>
           </a:p>
@@ -16467,7 +16369,7 @@
               </a:rPr>
             </a:br>
             <a:r>
-              <a:rPr lang="en-US" sz="4900" b="1" i="1" smtClean="0">
+              <a:rPr lang="en-US" sz="4900" b="1" i="1" dirty="0" smtClean="0">
                 <a:solidFill>
                   <a:schemeClr val="tx2">
                     <a:lumMod val="50000"/>
@@ -16521,8 +16423,8 @@
         </p:nvSpPr>
         <p:spPr>
           <a:xfrm>
-            <a:off x="283176" y="2240930"/>
-            <a:ext cx="11604024" cy="4617076"/>
+            <a:off x="283176" y="2662176"/>
+            <a:ext cx="11604024" cy="4195829"/>
           </a:xfrm>
         </p:spPr>
         <p:txBody>
@@ -16687,13 +16589,13 @@
           <p:nvPr>
             <p:extLst>
               <p:ext uri="{D42A27DB-BD31-4B8C-83A1-F6EECF244321}">
-                <p14:modId xmlns:p14="http://schemas.microsoft.com/office/powerpoint/2010/main" val="1362113109"/>
+                <p14:modId xmlns:p14="http://schemas.microsoft.com/office/powerpoint/2010/main" val="1050024530"/>
               </p:ext>
             </p:extLst>
           </p:nvPr>
         </p:nvGraphicFramePr>
         <p:xfrm>
-          <a:off x="2112135" y="4018214"/>
+          <a:off x="2274181" y="3726733"/>
           <a:ext cx="8060565" cy="2490543"/>
         </p:xfrm>
         <a:graphic>
@@ -16714,10 +16616,10 @@
   </p:clrMapOvr>
   <mc:AlternateContent xmlns:mc="http://schemas.openxmlformats.org/markup-compatibility/2006" xmlns:p14="http://schemas.microsoft.com/office/powerpoint/2010/main">
     <mc:Choice Requires="p14">
-      <p:transition p14:dur="0" advClick="0"/>
+      <p:transition p14:dur="10"/>
     </mc:Choice>
     <mc:Fallback xmlns="">
-      <p:transition advClick="0"/>
+      <p:transition/>
     </mc:Fallback>
   </mc:AlternateContent>
   <p:timing>
@@ -22175,8 +22077,8 @@
         </p:nvSpPr>
         <p:spPr>
           <a:xfrm>
-            <a:off x="4445355" y="2071270"/>
-            <a:ext cx="2619349" cy="475737"/>
+            <a:off x="4317585" y="2347475"/>
+            <a:ext cx="2619349" cy="361259"/>
           </a:xfrm>
           <a:prstGeom prst="ellipse">
             <a:avLst/>
@@ -22222,8 +22124,8 @@
         </p:nvSpPr>
         <p:spPr>
           <a:xfrm>
-            <a:off x="4485814" y="2605777"/>
-            <a:ext cx="2477237" cy="494275"/>
+            <a:off x="4547014" y="2731578"/>
+            <a:ext cx="2344492" cy="494275"/>
           </a:xfrm>
           <a:prstGeom prst="ellipse">
             <a:avLst/>
@@ -22269,7 +22171,7 @@
         </p:nvSpPr>
         <p:spPr>
           <a:xfrm>
-            <a:off x="4350657" y="4313887"/>
+            <a:off x="4350657" y="4298639"/>
             <a:ext cx="2649031" cy="494275"/>
           </a:xfrm>
           <a:prstGeom prst="ellipse">
@@ -22363,7 +22265,7 @@
         </p:nvSpPr>
         <p:spPr>
           <a:xfrm>
-            <a:off x="4380176" y="3167411"/>
+            <a:off x="4322107" y="3260582"/>
             <a:ext cx="2632212" cy="494275"/>
           </a:xfrm>
           <a:prstGeom prst="ellipse">
@@ -22408,13 +22310,14 @@
           <p:cNvPr id="20" name="Straight Arrow Connector 19"/>
           <p:cNvCxnSpPr>
             <a:stCxn id="97" idx="3"/>
+            <a:endCxn id="13" idx="2"/>
           </p:cNvCxnSpPr>
           <p:nvPr/>
         </p:nvCxnSpPr>
         <p:spPr>
           <a:xfrm flipV="1">
-            <a:off x="2769388" y="2968133"/>
-            <a:ext cx="1820763" cy="1085073"/>
+            <a:off x="2769389" y="2978716"/>
+            <a:ext cx="1777625" cy="1074489"/>
           </a:xfrm>
           <a:prstGeom prst="straightConnector1">
             <a:avLst/>
@@ -22452,7 +22355,7 @@
         </p:nvSpPr>
         <p:spPr>
           <a:xfrm>
-            <a:off x="4346224" y="4907451"/>
+            <a:off x="4311872" y="4822932"/>
             <a:ext cx="2687816" cy="494275"/>
           </a:xfrm>
           <a:prstGeom prst="ellipse">
@@ -22598,8 +22501,8 @@
         </p:nvCxnSpPr>
         <p:spPr>
           <a:xfrm flipH="1" flipV="1">
-            <a:off x="7064704" y="2309133"/>
-            <a:ext cx="1646637" cy="545995"/>
+            <a:off x="6936934" y="2528105"/>
+            <a:ext cx="1774412" cy="327022"/>
           </a:xfrm>
           <a:prstGeom prst="straightConnector1">
             <a:avLst/>
@@ -22855,13 +22758,14 @@
           <p:cNvPr id="69" name="Straight Arrow Connector 68"/>
           <p:cNvCxnSpPr>
             <a:stCxn id="5" idx="3"/>
+            <a:endCxn id="13" idx="2"/>
           </p:cNvCxnSpPr>
           <p:nvPr/>
         </p:nvCxnSpPr>
         <p:spPr>
           <a:xfrm>
-            <a:off x="2749165" y="2157555"/>
-            <a:ext cx="1797849" cy="583287"/>
+            <a:off x="2749159" y="2157555"/>
+            <a:ext cx="1797855" cy="821161"/>
           </a:xfrm>
           <a:prstGeom prst="straightConnector1">
             <a:avLst/>
@@ -22903,7 +22807,7 @@
         <p:spPr>
           <a:xfrm>
             <a:off x="2749159" y="2157555"/>
-            <a:ext cx="1631017" cy="1256994"/>
+            <a:ext cx="1572948" cy="1350165"/>
           </a:xfrm>
           <a:prstGeom prst="straightConnector1">
             <a:avLst/>
@@ -22945,7 +22849,7 @@
         <p:spPr>
           <a:xfrm>
             <a:off x="2749159" y="2157555"/>
-            <a:ext cx="1601498" cy="2403470"/>
+            <a:ext cx="1601498" cy="2388222"/>
           </a:xfrm>
           <a:prstGeom prst="straightConnector1">
             <a:avLst/>
@@ -22987,7 +22891,7 @@
         <p:spPr>
           <a:xfrm>
             <a:off x="2749159" y="2157555"/>
-            <a:ext cx="1597065" cy="2997034"/>
+            <a:ext cx="1562713" cy="2912515"/>
           </a:xfrm>
           <a:prstGeom prst="straightConnector1">
             <a:avLst/>
@@ -23268,48 +23172,6 @@
           </a:fontRef>
         </p:style>
       </p:cxnSp>
-      <p:cxnSp>
-        <p:nvCxnSpPr>
-          <p:cNvPr id="119" name="Straight Arrow Connector 118"/>
-          <p:cNvCxnSpPr>
-            <a:stCxn id="34" idx="2"/>
-            <a:endCxn id="97" idx="3"/>
-          </p:cNvCxnSpPr>
-          <p:nvPr/>
-        </p:nvCxnSpPr>
-        <p:spPr>
-          <a:xfrm flipH="1" flipV="1">
-            <a:off x="2769389" y="4053205"/>
-            <a:ext cx="1576835" cy="1101384"/>
-          </a:xfrm>
-          <a:prstGeom prst="straightConnector1">
-            <a:avLst/>
-          </a:prstGeom>
-          <a:ln w="57150">
-            <a:solidFill>
-              <a:schemeClr val="tx1">
-                <a:lumMod val="85000"/>
-                <a:lumOff val="15000"/>
-              </a:schemeClr>
-            </a:solidFill>
-            <a:tailEnd type="triangle"/>
-          </a:ln>
-        </p:spPr>
-        <p:style>
-          <a:lnRef idx="2">
-            <a:schemeClr val="dk1"/>
-          </a:lnRef>
-          <a:fillRef idx="0">
-            <a:schemeClr val="dk1"/>
-          </a:fillRef>
-          <a:effectRef idx="1">
-            <a:schemeClr val="dk1"/>
-          </a:effectRef>
-          <a:fontRef idx="minor">
-            <a:schemeClr val="tx1"/>
-          </a:fontRef>
-        </p:style>
-      </p:cxnSp>
       <p:sp>
         <p:nvSpPr>
           <p:cNvPr id="3" name="Oval 2"/>
@@ -23370,14 +23232,15 @@
         <p:nvCxnSpPr>
           <p:cNvPr id="48" name="Straight Arrow Connector 47"/>
           <p:cNvCxnSpPr>
+            <a:stCxn id="97" idx="3"/>
             <a:endCxn id="3" idx="3"/>
           </p:cNvCxnSpPr>
           <p:nvPr/>
         </p:nvCxnSpPr>
         <p:spPr>
           <a:xfrm flipV="1">
-            <a:off x="2795787" y="1697101"/>
-            <a:ext cx="971767" cy="2125731"/>
+            <a:off x="2769389" y="1697108"/>
+            <a:ext cx="998158" cy="2356097"/>
           </a:xfrm>
           <a:prstGeom prst="straightConnector1">
             <a:avLst/>
@@ -23456,14 +23319,13 @@
           <p:cNvPr id="75" name="Straight Arrow Connector 74"/>
           <p:cNvCxnSpPr>
             <a:stCxn id="12" idx="2"/>
-            <a:endCxn id="5" idx="3"/>
           </p:cNvCxnSpPr>
           <p:nvPr/>
         </p:nvCxnSpPr>
         <p:spPr>
           <a:xfrm flipH="1" flipV="1">
-            <a:off x="2749165" y="2157549"/>
-            <a:ext cx="1696196" cy="151584"/>
+            <a:off x="2731845" y="1816270"/>
+            <a:ext cx="1585740" cy="711835"/>
           </a:xfrm>
           <a:prstGeom prst="straightConnector1">
             <a:avLst/>
@@ -23503,8 +23365,8 @@
         </p:nvCxnSpPr>
         <p:spPr>
           <a:xfrm flipH="1">
-            <a:off x="2831896" y="2309134"/>
-            <a:ext cx="1613465" cy="1627149"/>
+            <a:off x="2731850" y="2528105"/>
+            <a:ext cx="1585735" cy="1187331"/>
           </a:xfrm>
           <a:prstGeom prst="straightConnector1">
             <a:avLst/>
@@ -23663,6 +23525,270 @@
             <a:schemeClr val="dk1"/>
           </a:fillRef>
           <a:effectRef idx="1">
+            <a:schemeClr val="dk1"/>
+          </a:effectRef>
+          <a:fontRef idx="minor">
+            <a:schemeClr val="tx1"/>
+          </a:fontRef>
+        </p:style>
+      </p:cxnSp>
+      <p:sp>
+        <p:nvSpPr>
+          <p:cNvPr id="49" name="Oval 48"/>
+          <p:cNvSpPr/>
+          <p:nvPr/>
+        </p:nvSpPr>
+        <p:spPr>
+          <a:xfrm>
+            <a:off x="4273891" y="5321778"/>
+            <a:ext cx="2687816" cy="494275"/>
+          </a:xfrm>
+          <a:prstGeom prst="ellipse">
+            <a:avLst/>
+          </a:prstGeom>
+          <a:solidFill>
+            <a:schemeClr val="accent6">
+              <a:lumMod val="60000"/>
+              <a:lumOff val="40000"/>
+            </a:schemeClr>
+          </a:solidFill>
+        </p:spPr>
+        <p:style>
+          <a:lnRef idx="2">
+            <a:schemeClr val="dk1"/>
+          </a:lnRef>
+          <a:fillRef idx="1">
+            <a:schemeClr val="lt1"/>
+          </a:fillRef>
+          <a:effectRef idx="0">
+            <a:schemeClr val="dk1"/>
+          </a:effectRef>
+          <a:fontRef idx="minor">
+            <a:schemeClr val="dk1"/>
+          </a:fontRef>
+        </p:style>
+        <p:txBody>
+          <a:bodyPr rtlCol="0" anchor="ctr"/>
+          <a:lstStyle/>
+          <a:p>
+            <a:pPr algn="ctr"/>
+            <a:r>
+              <a:rPr lang="en-US" sz="1600" dirty="0" smtClean="0"/>
+              <a:t>Follow up patient</a:t>
+            </a:r>
+            <a:endParaRPr lang="en-US" sz="1600" dirty="0"/>
+          </a:p>
+        </p:txBody>
+      </p:sp>
+      <p:cxnSp>
+        <p:nvCxnSpPr>
+          <p:cNvPr id="56" name="Straight Arrow Connector 55"/>
+          <p:cNvCxnSpPr>
+            <a:stCxn id="97" idx="3"/>
+            <a:endCxn id="49" idx="2"/>
+          </p:cNvCxnSpPr>
+          <p:nvPr/>
+        </p:nvCxnSpPr>
+        <p:spPr>
+          <a:xfrm>
+            <a:off x="2769389" y="4053205"/>
+            <a:ext cx="1504502" cy="1515711"/>
+          </a:xfrm>
+          <a:prstGeom prst="straightConnector1">
+            <a:avLst/>
+          </a:prstGeom>
+          <a:ln w="57150">
+            <a:solidFill>
+              <a:schemeClr val="tx1">
+                <a:lumMod val="85000"/>
+                <a:lumOff val="15000"/>
+              </a:schemeClr>
+            </a:solidFill>
+            <a:tailEnd type="triangle"/>
+          </a:ln>
+        </p:spPr>
+        <p:style>
+          <a:lnRef idx="2">
+            <a:schemeClr val="dk1"/>
+          </a:lnRef>
+          <a:fillRef idx="0">
+            <a:schemeClr val="dk1"/>
+          </a:fillRef>
+          <a:effectRef idx="1">
+            <a:schemeClr val="dk1"/>
+          </a:effectRef>
+          <a:fontRef idx="minor">
+            <a:schemeClr val="tx1"/>
+          </a:fontRef>
+        </p:style>
+      </p:cxnSp>
+      <p:cxnSp>
+        <p:nvCxnSpPr>
+          <p:cNvPr id="62" name="Straight Arrow Connector 61"/>
+          <p:cNvCxnSpPr>
+            <a:stCxn id="5" idx="3"/>
+            <a:endCxn id="17" idx="2"/>
+          </p:cNvCxnSpPr>
+          <p:nvPr/>
+        </p:nvCxnSpPr>
+        <p:spPr>
+          <a:xfrm>
+            <a:off x="2749159" y="2157555"/>
+            <a:ext cx="1593199" cy="1837617"/>
+          </a:xfrm>
+          <a:prstGeom prst="straightConnector1">
+            <a:avLst/>
+          </a:prstGeom>
+          <a:ln w="57150">
+            <a:solidFill>
+              <a:schemeClr val="tx1">
+                <a:lumMod val="85000"/>
+                <a:lumOff val="15000"/>
+              </a:schemeClr>
+            </a:solidFill>
+            <a:tailEnd type="triangle"/>
+          </a:ln>
+        </p:spPr>
+        <p:style>
+          <a:lnRef idx="1">
+            <a:schemeClr val="dk1"/>
+          </a:lnRef>
+          <a:fillRef idx="0">
+            <a:schemeClr val="dk1"/>
+          </a:fillRef>
+          <a:effectRef idx="0">
+            <a:schemeClr val="dk1"/>
+          </a:effectRef>
+          <a:fontRef idx="minor">
+            <a:schemeClr val="tx1"/>
+          </a:fontRef>
+        </p:style>
+      </p:cxnSp>
+      <p:sp>
+        <p:nvSpPr>
+          <p:cNvPr id="78" name="Oval 77"/>
+          <p:cNvSpPr/>
+          <p:nvPr/>
+        </p:nvSpPr>
+        <p:spPr>
+          <a:xfrm>
+            <a:off x="4273891" y="1897811"/>
+            <a:ext cx="2619349" cy="414935"/>
+          </a:xfrm>
+          <a:prstGeom prst="ellipse">
+            <a:avLst/>
+          </a:prstGeom>
+          <a:solidFill>
+            <a:schemeClr val="accent6">
+              <a:lumMod val="60000"/>
+              <a:lumOff val="40000"/>
+            </a:schemeClr>
+          </a:solidFill>
+        </p:spPr>
+        <p:style>
+          <a:lnRef idx="2">
+            <a:schemeClr val="dk1"/>
+          </a:lnRef>
+          <a:fillRef idx="1">
+            <a:schemeClr val="lt1"/>
+          </a:fillRef>
+          <a:effectRef idx="0">
+            <a:schemeClr val="dk1"/>
+          </a:effectRef>
+          <a:fontRef idx="minor">
+            <a:schemeClr val="dk1"/>
+          </a:fontRef>
+        </p:style>
+        <p:txBody>
+          <a:bodyPr rtlCol="0" anchor="ctr"/>
+          <a:lstStyle/>
+          <a:p>
+            <a:pPr algn="ctr"/>
+            <a:r>
+              <a:rPr lang="en-US" dirty="0" smtClean="0"/>
+              <a:t>Visit  </a:t>
+            </a:r>
+            <a:endParaRPr lang="en-US" dirty="0"/>
+          </a:p>
+        </p:txBody>
+      </p:sp>
+      <p:cxnSp>
+        <p:nvCxnSpPr>
+          <p:cNvPr id="81" name="Straight Arrow Connector 80"/>
+          <p:cNvCxnSpPr>
+            <a:stCxn id="5" idx="3"/>
+            <a:endCxn id="78" idx="2"/>
+          </p:cNvCxnSpPr>
+          <p:nvPr/>
+        </p:nvCxnSpPr>
+        <p:spPr>
+          <a:xfrm flipV="1">
+            <a:off x="2749159" y="2105279"/>
+            <a:ext cx="1524732" cy="52276"/>
+          </a:xfrm>
+          <a:prstGeom prst="straightConnector1">
+            <a:avLst/>
+          </a:prstGeom>
+          <a:ln w="57150">
+            <a:solidFill>
+              <a:schemeClr val="tx1">
+                <a:lumMod val="85000"/>
+                <a:lumOff val="15000"/>
+              </a:schemeClr>
+            </a:solidFill>
+            <a:tailEnd type="triangle"/>
+          </a:ln>
+        </p:spPr>
+        <p:style>
+          <a:lnRef idx="1">
+            <a:schemeClr val="dk1"/>
+          </a:lnRef>
+          <a:fillRef idx="0">
+            <a:schemeClr val="dk1"/>
+          </a:fillRef>
+          <a:effectRef idx="0">
+            <a:schemeClr val="dk1"/>
+          </a:effectRef>
+          <a:fontRef idx="minor">
+            <a:schemeClr val="tx1"/>
+          </a:fontRef>
+        </p:style>
+      </p:cxnSp>
+      <p:cxnSp>
+        <p:nvCxnSpPr>
+          <p:cNvPr id="84" name="Straight Arrow Connector 83"/>
+          <p:cNvCxnSpPr>
+            <a:stCxn id="97" idx="3"/>
+            <a:endCxn id="78" idx="2"/>
+          </p:cNvCxnSpPr>
+          <p:nvPr/>
+        </p:nvCxnSpPr>
+        <p:spPr>
+          <a:xfrm flipV="1">
+            <a:off x="2769389" y="2105279"/>
+            <a:ext cx="1504502" cy="1947926"/>
+          </a:xfrm>
+          <a:prstGeom prst="straightConnector1">
+            <a:avLst/>
+          </a:prstGeom>
+          <a:ln w="57150">
+            <a:solidFill>
+              <a:schemeClr val="tx1">
+                <a:lumMod val="85000"/>
+                <a:lumOff val="15000"/>
+              </a:schemeClr>
+            </a:solidFill>
+            <a:tailEnd type="triangle"/>
+          </a:ln>
+        </p:spPr>
+        <p:style>
+          <a:lnRef idx="1">
+            <a:schemeClr val="dk1"/>
+          </a:lnRef>
+          <a:fillRef idx="0">
+            <a:schemeClr val="dk1"/>
+          </a:fillRef>
+          <a:effectRef idx="0">
             <a:schemeClr val="dk1"/>
           </a:effectRef>
           <a:fontRef idx="minor">
@@ -24017,10 +24143,13 @@
                     <a:lumMod val="50000"/>
                   </a:schemeClr>
                 </a:solidFill>
+                <a:latin typeface="+mn-lt"/>
               </a:rPr>
               <a:t>System Comparison</a:t>
             </a:r>
-            <a:endParaRPr lang="en-US" dirty="0"/>
+            <a:endParaRPr lang="en-US" b="1" dirty="0">
+              <a:latin typeface="+mn-lt"/>
+            </a:endParaRPr>
           </a:p>
         </p:txBody>
       </p:sp>
@@ -26734,6 +26863,416 @@
         </p:nvSpPr>
         <p:spPr>
           <a:xfrm>
+            <a:off x="838200" y="365126"/>
+            <a:ext cx="10515600" cy="803918"/>
+          </a:xfrm>
+        </p:spPr>
+        <p:txBody>
+          <a:bodyPr/>
+          <a:lstStyle/>
+          <a:p>
+            <a:pPr algn="ctr"/>
+            <a:r>
+              <a:rPr lang="en-US" b="1" dirty="0" smtClean="0">
+                <a:solidFill>
+                  <a:schemeClr val="tx2">
+                    <a:lumMod val="50000"/>
+                  </a:schemeClr>
+                </a:solidFill>
+              </a:rPr>
+              <a:t>Appointment Booking Page</a:t>
+            </a:r>
+            <a:endParaRPr lang="en-US" dirty="0"/>
+          </a:p>
+        </p:txBody>
+      </p:sp>
+      <p:sp>
+        <p:nvSpPr>
+          <p:cNvPr id="4" name="Footer Placeholder 3"/>
+          <p:cNvSpPr>
+            <a:spLocks noGrp="1"/>
+          </p:cNvSpPr>
+          <p:nvPr>
+            <p:ph type="ftr" sz="quarter" idx="11"/>
+          </p:nvPr>
+        </p:nvSpPr>
+        <p:spPr/>
+        <p:txBody>
+          <a:bodyPr/>
+          <a:lstStyle/>
+          <a:p>
+            <a:endParaRPr lang="en-US"/>
+          </a:p>
+        </p:txBody>
+      </p:sp>
+      <p:sp>
+        <p:nvSpPr>
+          <p:cNvPr id="5" name="Slide Number Placeholder 4"/>
+          <p:cNvSpPr>
+            <a:spLocks noGrp="1"/>
+          </p:cNvSpPr>
+          <p:nvPr>
+            <p:ph type="sldNum" sz="quarter" idx="12"/>
+          </p:nvPr>
+        </p:nvSpPr>
+        <p:spPr/>
+        <p:txBody>
+          <a:bodyPr/>
+          <a:lstStyle/>
+          <a:p>
+            <a:fld id="{12DFE2B3-9440-4CDE-AF16-9399CD8558BB}" type="slidenum">
+              <a:rPr lang="en-US" smtClean="0"/>
+              <a:t>19</a:t>
+            </a:fld>
+            <a:endParaRPr lang="en-US"/>
+          </a:p>
+        </p:txBody>
+      </p:sp>
+      <p:pic>
+        <p:nvPicPr>
+          <p:cNvPr id="6" name="Picture 5"/>
+          <p:cNvPicPr>
+            <a:picLocks noChangeAspect="1"/>
+          </p:cNvPicPr>
+          <p:nvPr/>
+        </p:nvPicPr>
+        <p:blipFill>
+          <a:blip r:embed="rId2">
+            <a:extLst>
+              <a:ext uri="{28A0092B-C50C-407E-A947-70E740481C1C}">
+                <a14:useLocalDpi xmlns:a14="http://schemas.microsoft.com/office/drawing/2010/main" val="0"/>
+              </a:ext>
+            </a:extLst>
+          </a:blip>
+          <a:stretch>
+            <a:fillRect/>
+          </a:stretch>
+        </p:blipFill>
+        <p:spPr>
+          <a:xfrm>
+            <a:off x="1312761" y="1690688"/>
+            <a:ext cx="9116027" cy="4939120"/>
+          </a:xfrm>
+          <a:prstGeom prst="rect">
+            <a:avLst/>
+          </a:prstGeom>
+        </p:spPr>
+      </p:pic>
+    </p:spTree>
+    <p:extLst>
+      <p:ext uri="{BB962C8B-B14F-4D97-AF65-F5344CB8AC3E}">
+        <p14:creationId xmlns:p14="http://schemas.microsoft.com/office/powerpoint/2010/main" val="3621082832"/>
+      </p:ext>
+    </p:extLst>
+  </p:cSld>
+  <p:clrMapOvr>
+    <a:masterClrMapping/>
+  </p:clrMapOvr>
+</p:sld>
+</file>
+
+<file path=ppt/slides/slide2.xml><?xml version="1.0" encoding="utf-8"?>
+<p:sld xmlns:a="http://schemas.openxmlformats.org/drawingml/2006/main" xmlns:r="http://schemas.openxmlformats.org/officeDocument/2006/relationships" xmlns:p="http://schemas.openxmlformats.org/presentationml/2006/main">
+  <p:cSld>
+    <p:spTree>
+      <p:nvGrpSpPr>
+        <p:cNvPr id="1" name=""/>
+        <p:cNvGrpSpPr/>
+        <p:nvPr/>
+      </p:nvGrpSpPr>
+      <p:grpSpPr>
+        <a:xfrm>
+          <a:off x="0" y="0"/>
+          <a:ext cx="0" cy="0"/>
+          <a:chOff x="0" y="0"/>
+          <a:chExt cx="0" cy="0"/>
+        </a:xfrm>
+      </p:grpSpPr>
+      <p:sp>
+        <p:nvSpPr>
+          <p:cNvPr id="2" name="Title 1"/>
+          <p:cNvSpPr>
+            <a:spLocks noGrp="1"/>
+          </p:cNvSpPr>
+          <p:nvPr>
+            <p:ph type="title"/>
+          </p:nvPr>
+        </p:nvSpPr>
+        <p:spPr>
+          <a:xfrm>
+            <a:off x="838200" y="365131"/>
+            <a:ext cx="10515600" cy="1051551"/>
+          </a:xfrm>
+        </p:spPr>
+        <p:txBody>
+          <a:bodyPr/>
+          <a:lstStyle/>
+          <a:p>
+            <a:pPr algn="ctr"/>
+            <a:r>
+              <a:rPr lang="en-US" sz="4800" b="1" dirty="0">
+                <a:solidFill>
+                  <a:schemeClr val="tx2">
+                    <a:lumMod val="50000"/>
+                  </a:schemeClr>
+                </a:solidFill>
+                <a:latin typeface="+mn-lt"/>
+              </a:rPr>
+              <a:t>Introduction</a:t>
+            </a:r>
+            <a:r>
+              <a:rPr lang="en-US" b="1" dirty="0" smtClean="0">
+                <a:latin typeface="+mn-lt"/>
+              </a:rPr>
+              <a:t> </a:t>
+            </a:r>
+            <a:endParaRPr lang="en-US" b="1" dirty="0">
+              <a:latin typeface="+mn-lt"/>
+            </a:endParaRPr>
+          </a:p>
+        </p:txBody>
+      </p:sp>
+      <p:sp>
+        <p:nvSpPr>
+          <p:cNvPr id="3" name="Content Placeholder 2"/>
+          <p:cNvSpPr>
+            <a:spLocks noGrp="1"/>
+          </p:cNvSpPr>
+          <p:nvPr>
+            <p:ph idx="1"/>
+          </p:nvPr>
+        </p:nvSpPr>
+        <p:spPr>
+          <a:xfrm>
+            <a:off x="1117600" y="1562100"/>
+            <a:ext cx="9800608" cy="4340857"/>
+          </a:xfrm>
+        </p:spPr>
+        <p:txBody>
+          <a:bodyPr>
+            <a:normAutofit/>
+          </a:bodyPr>
+          <a:lstStyle/>
+          <a:p>
+            <a:pPr algn="just">
+              <a:buFont typeface="Wingdings" panose="05000000000000000000" pitchFamily="2" charset="2"/>
+              <a:buChar char="Ø"/>
+            </a:pPr>
+            <a:r>
+              <a:rPr lang="en-US" dirty="0" smtClean="0"/>
+              <a:t> By this system we can book doctors appointment in anywhere</a:t>
+            </a:r>
+          </a:p>
+          <a:p>
+            <a:pPr marL="0" indent="0" algn="just">
+              <a:buNone/>
+            </a:pPr>
+            <a:r>
+              <a:rPr lang="en-US" dirty="0" smtClean="0"/>
+              <a:t>     in Bangladesh. </a:t>
+            </a:r>
+          </a:p>
+          <a:p>
+            <a:pPr algn="just">
+              <a:buFont typeface="Wingdings" panose="05000000000000000000" pitchFamily="2" charset="2"/>
+              <a:buChar char="Ø"/>
+            </a:pPr>
+            <a:r>
+              <a:rPr lang="en-US" dirty="0" smtClean="0"/>
+              <a:t> By this </a:t>
+            </a:r>
+            <a:r>
+              <a:rPr lang="en-US" dirty="0"/>
+              <a:t>system </a:t>
+            </a:r>
+            <a:r>
+              <a:rPr lang="en-US" dirty="0" smtClean="0"/>
+              <a:t>user can </a:t>
+            </a:r>
+            <a:r>
+              <a:rPr lang="en-US" dirty="0"/>
+              <a:t>able to </a:t>
+            </a:r>
+            <a:r>
+              <a:rPr lang="en-US" dirty="0" smtClean="0"/>
+              <a:t>book </a:t>
+            </a:r>
+            <a:r>
+              <a:rPr lang="en-US" dirty="0"/>
+              <a:t>doctor’s appointment </a:t>
+            </a:r>
+            <a:r>
+              <a:rPr lang="en-US" dirty="0" smtClean="0"/>
+              <a:t>from</a:t>
+            </a:r>
+          </a:p>
+          <a:p>
+            <a:pPr marL="0" indent="0" algn="just">
+              <a:buNone/>
+            </a:pPr>
+            <a:r>
+              <a:rPr lang="en-US" dirty="0"/>
+              <a:t> </a:t>
+            </a:r>
+            <a:r>
+              <a:rPr lang="en-US" dirty="0" smtClean="0"/>
+              <a:t>    nearest </a:t>
+            </a:r>
+            <a:r>
+              <a:rPr lang="en-US" dirty="0"/>
+              <a:t>doctor’s chamber. </a:t>
+            </a:r>
+            <a:endParaRPr lang="en-US" dirty="0" smtClean="0"/>
+          </a:p>
+          <a:p>
+            <a:pPr algn="just">
+              <a:buFont typeface="Wingdings" panose="05000000000000000000" pitchFamily="2" charset="2"/>
+              <a:buChar char="Ø"/>
+            </a:pPr>
+            <a:r>
+              <a:rPr lang="en-US" dirty="0" smtClean="0"/>
+              <a:t> By this system user can able to find doctor based on users</a:t>
+            </a:r>
+          </a:p>
+          <a:p>
+            <a:pPr marL="0" indent="0" algn="just">
+              <a:buNone/>
+            </a:pPr>
+            <a:r>
+              <a:rPr lang="en-US" dirty="0" smtClean="0"/>
+              <a:t>     location. </a:t>
+            </a:r>
+          </a:p>
+          <a:p>
+            <a:pPr algn="just">
+              <a:buFont typeface="Wingdings" panose="05000000000000000000" pitchFamily="2" charset="2"/>
+              <a:buChar char="Ø"/>
+            </a:pPr>
+            <a:r>
+              <a:rPr lang="en-US" dirty="0"/>
+              <a:t> </a:t>
+            </a:r>
+            <a:r>
+              <a:rPr lang="en-US" dirty="0" smtClean="0"/>
+              <a:t>Doctor can follow patient’s condition by this system.</a:t>
+            </a:r>
+          </a:p>
+          <a:p>
+            <a:pPr algn="just">
+              <a:buFont typeface="Wingdings" panose="05000000000000000000" pitchFamily="2" charset="2"/>
+              <a:buChar char="Ø"/>
+            </a:pPr>
+            <a:r>
+              <a:rPr lang="en-US" dirty="0" smtClean="0"/>
+              <a:t> This system can store patient information for farther use.</a:t>
+            </a:r>
+            <a:endParaRPr lang="en-US" dirty="0"/>
+          </a:p>
+        </p:txBody>
+      </p:sp>
+      <p:sp>
+        <p:nvSpPr>
+          <p:cNvPr id="5" name="Footer Placeholder 4"/>
+          <p:cNvSpPr>
+            <a:spLocks noGrp="1"/>
+          </p:cNvSpPr>
+          <p:nvPr>
+            <p:ph type="ftr" sz="quarter" idx="11"/>
+          </p:nvPr>
+        </p:nvSpPr>
+        <p:spPr/>
+        <p:txBody>
+          <a:bodyPr/>
+          <a:lstStyle/>
+          <a:p>
+            <a:endParaRPr lang="en-US"/>
+          </a:p>
+        </p:txBody>
+      </p:sp>
+      <p:sp>
+        <p:nvSpPr>
+          <p:cNvPr id="4" name="Slide Number Placeholder 3"/>
+          <p:cNvSpPr>
+            <a:spLocks noGrp="1"/>
+          </p:cNvSpPr>
+          <p:nvPr>
+            <p:ph type="sldNum" sz="quarter" idx="12"/>
+          </p:nvPr>
+        </p:nvSpPr>
+        <p:spPr/>
+        <p:txBody>
+          <a:bodyPr/>
+          <a:lstStyle/>
+          <a:p>
+            <a:fld id="{12DFE2B3-9440-4CDE-AF16-9399CD8558BB}" type="slidenum">
+              <a:rPr lang="en-US" smtClean="0"/>
+              <a:t>2</a:t>
+            </a:fld>
+            <a:endParaRPr lang="en-US"/>
+          </a:p>
+        </p:txBody>
+      </p:sp>
+    </p:spTree>
+    <p:extLst>
+      <p:ext uri="{BB962C8B-B14F-4D97-AF65-F5344CB8AC3E}">
+        <p14:creationId xmlns:p14="http://schemas.microsoft.com/office/powerpoint/2010/main" val="142213943"/>
+      </p:ext>
+    </p:extLst>
+  </p:cSld>
+  <p:clrMapOvr>
+    <a:masterClrMapping/>
+  </p:clrMapOvr>
+  <mc:AlternateContent xmlns:mc="http://schemas.openxmlformats.org/markup-compatibility/2006" xmlns:p14="http://schemas.microsoft.com/office/powerpoint/2010/main">
+    <mc:Choice Requires="p14">
+      <p:transition p14:dur="250" advClick="0">
+        <p14:gallery dir="l"/>
+      </p:transition>
+    </mc:Choice>
+    <mc:Fallback xmlns="">
+      <p:transition advClick="0">
+        <p:fade/>
+      </p:transition>
+    </mc:Fallback>
+  </mc:AlternateContent>
+  <p:timing>
+    <p:tnLst>
+      <p:par>
+        <p:cTn id="1" dur="indefinite" restart="never" nodeType="tmRoot"/>
+      </p:par>
+    </p:tnLst>
+  </p:timing>
+</p:sld>
+</file>
+
+<file path=ppt/slides/slide20.xml><?xml version="1.0" encoding="utf-8"?>
+<p:sld xmlns:a="http://schemas.openxmlformats.org/drawingml/2006/main" xmlns:r="http://schemas.openxmlformats.org/officeDocument/2006/relationships" xmlns:p="http://schemas.openxmlformats.org/presentationml/2006/main">
+  <p:cSld>
+    <p:spTree>
+      <p:nvGrpSpPr>
+        <p:cNvPr id="1" name=""/>
+        <p:cNvGrpSpPr/>
+        <p:nvPr/>
+      </p:nvGrpSpPr>
+      <p:grpSpPr>
+        <a:xfrm>
+          <a:off x="0" y="0"/>
+          <a:ext cx="0" cy="0"/>
+          <a:chOff x="0" y="0"/>
+          <a:chExt cx="0" cy="0"/>
+        </a:xfrm>
+      </p:grpSpPr>
+      <p:sp>
+        <p:nvSpPr>
+          <p:cNvPr id="2" name="Title 1"/>
+          <p:cNvSpPr>
+            <a:spLocks noGrp="1"/>
+          </p:cNvSpPr>
+          <p:nvPr>
+            <p:ph type="title"/>
+          </p:nvPr>
+        </p:nvSpPr>
+        <p:spPr>
+          <a:xfrm>
             <a:off x="838200" y="365125"/>
             <a:ext cx="10515600" cy="803275"/>
           </a:xfrm>
@@ -26773,17 +27312,7 @@
                   </a:schemeClr>
                 </a:solidFill>
               </a:rPr>
-              <a:t>Test </a:t>
-            </a:r>
-            <a:r>
-              <a:rPr lang="en-US" b="1" dirty="0" smtClean="0">
-                <a:solidFill>
-                  <a:schemeClr val="accent6">
-                    <a:lumMod val="50000"/>
-                  </a:schemeClr>
-                </a:solidFill>
-              </a:rPr>
-              <a:t>Case</a:t>
+              <a:t>Test Case</a:t>
             </a:r>
             <a:r>
               <a:rPr lang="en-US" b="1" dirty="0" smtClean="0">
@@ -26816,7 +27345,7 @@
           <a:p>
             <a:fld id="{12DFE2B3-9440-4CDE-AF16-9399CD8558BB}" type="slidenum">
               <a:rPr lang="en-US" smtClean="0"/>
-              <a:t>19</a:t>
+              <a:t>20</a:t>
             </a:fld>
             <a:endParaRPr lang="en-US"/>
           </a:p>
@@ -26831,7 +27360,7 @@
           <p:nvPr>
             <p:extLst>
               <p:ext uri="{D42A27DB-BD31-4B8C-83A1-F6EECF244321}">
-                <p14:modId xmlns:p14="http://schemas.microsoft.com/office/powerpoint/2010/main" val="1209609703"/>
+                <p14:modId xmlns:p14="http://schemas.microsoft.com/office/powerpoint/2010/main" val="3123389670"/>
               </p:ext>
             </p:extLst>
           </p:nvPr>
@@ -27167,7 +27696,12 @@
                       <a:headEnd type="none" w="med" len="med"/>
                       <a:tailEnd type="none" w="med" len="med"/>
                     </a:lnB>
-                    <a:noFill/>
+                    <a:solidFill>
+                      <a:schemeClr val="accent2">
+                        <a:lumMod val="20000"/>
+                        <a:lumOff val="80000"/>
+                      </a:schemeClr>
+                    </a:solidFill>
                   </a:tcPr>
                 </a:tc>
                 <a:tc>
@@ -27233,7 +27767,12 @@
                       <a:headEnd type="none" w="med" len="med"/>
                       <a:tailEnd type="none" w="med" len="med"/>
                     </a:lnB>
-                    <a:noFill/>
+                    <a:solidFill>
+                      <a:schemeClr val="accent2">
+                        <a:lumMod val="20000"/>
+                        <a:lumOff val="80000"/>
+                      </a:schemeClr>
+                    </a:solidFill>
                   </a:tcPr>
                 </a:tc>
                 <a:tc>
@@ -27392,7 +27931,12 @@
                       <a:headEnd type="none" w="med" len="med"/>
                       <a:tailEnd type="none" w="med" len="med"/>
                     </a:lnB>
-                    <a:noFill/>
+                    <a:solidFill>
+                      <a:schemeClr val="accent2">
+                        <a:lumMod val="20000"/>
+                        <a:lumOff val="80000"/>
+                      </a:schemeClr>
+                    </a:solidFill>
                   </a:tcPr>
                 </a:tc>
                 <a:extLst>
@@ -27456,7 +28000,12 @@
                       <a:headEnd type="none" w="med" len="med"/>
                       <a:tailEnd type="none" w="med" len="med"/>
                     </a:lnB>
-                    <a:noFill/>
+                    <a:solidFill>
+                      <a:schemeClr val="accent2">
+                        <a:lumMod val="20000"/>
+                        <a:lumOff val="80000"/>
+                      </a:schemeClr>
+                    </a:solidFill>
                   </a:tcPr>
                 </a:tc>
                 <a:tc>
@@ -27554,7 +28103,12 @@
                       <a:headEnd type="none" w="med" len="med"/>
                       <a:tailEnd type="none" w="med" len="med"/>
                     </a:lnB>
-                    <a:noFill/>
+                    <a:solidFill>
+                      <a:schemeClr val="accent2">
+                        <a:lumMod val="20000"/>
+                        <a:lumOff val="80000"/>
+                      </a:schemeClr>
+                    </a:solidFill>
                   </a:tcPr>
                 </a:tc>
                 <a:tc>
@@ -27749,7 +28303,12 @@
                       <a:headEnd type="none" w="med" len="med"/>
                       <a:tailEnd type="none" w="med" len="med"/>
                     </a:lnB>
-                    <a:noFill/>
+                    <a:solidFill>
+                      <a:schemeClr val="accent2">
+                        <a:lumMod val="20000"/>
+                        <a:lumOff val="80000"/>
+                      </a:schemeClr>
+                    </a:solidFill>
                   </a:tcPr>
                 </a:tc>
                 <a:extLst>
@@ -27813,7 +28372,12 @@
                       <a:headEnd type="none" w="med" len="med"/>
                       <a:tailEnd type="none" w="med" len="med"/>
                     </a:lnB>
-                    <a:noFill/>
+                    <a:solidFill>
+                      <a:schemeClr val="accent2">
+                        <a:lumMod val="20000"/>
+                        <a:lumOff val="80000"/>
+                      </a:schemeClr>
+                    </a:solidFill>
                   </a:tcPr>
                 </a:tc>
                 <a:tc>
@@ -27939,7 +28503,12 @@
                       <a:headEnd type="none" w="med" len="med"/>
                       <a:tailEnd type="none" w="med" len="med"/>
                     </a:lnB>
-                    <a:noFill/>
+                    <a:solidFill>
+                      <a:schemeClr val="accent2">
+                        <a:lumMod val="20000"/>
+                        <a:lumOff val="80000"/>
+                      </a:schemeClr>
+                    </a:solidFill>
                   </a:tcPr>
                 </a:tc>
                 <a:tc>
@@ -28088,7 +28657,12 @@
                       <a:headEnd type="none" w="med" len="med"/>
                       <a:tailEnd type="none" w="med" len="med"/>
                     </a:lnB>
-                    <a:noFill/>
+                    <a:solidFill>
+                      <a:schemeClr val="accent2">
+                        <a:lumMod val="20000"/>
+                        <a:lumOff val="80000"/>
+                      </a:schemeClr>
+                    </a:solidFill>
                   </a:tcPr>
                 </a:tc>
                 <a:extLst>
@@ -28152,7 +28726,12 @@
                       <a:headEnd type="none" w="med" len="med"/>
                       <a:tailEnd type="none" w="med" len="med"/>
                     </a:lnB>
-                    <a:noFill/>
+                    <a:solidFill>
+                      <a:schemeClr val="accent2">
+                        <a:lumMod val="20000"/>
+                        <a:lumOff val="80000"/>
+                      </a:schemeClr>
+                    </a:solidFill>
                   </a:tcPr>
                 </a:tc>
                 <a:tc>
@@ -28226,7 +28805,12 @@
                       <a:headEnd type="none" w="med" len="med"/>
                       <a:tailEnd type="none" w="med" len="med"/>
                     </a:lnB>
-                    <a:noFill/>
+                    <a:solidFill>
+                      <a:schemeClr val="accent2">
+                        <a:lumMod val="20000"/>
+                        <a:lumOff val="80000"/>
+                      </a:schemeClr>
+                    </a:solidFill>
                   </a:tcPr>
                 </a:tc>
                 <a:tc>
@@ -28343,7 +28927,12 @@
                       <a:headEnd type="none" w="med" len="med"/>
                       <a:tailEnd type="none" w="med" len="med"/>
                     </a:lnB>
-                    <a:noFill/>
+                    <a:solidFill>
+                      <a:schemeClr val="accent2">
+                        <a:lumMod val="20000"/>
+                        <a:lumOff val="80000"/>
+                      </a:schemeClr>
+                    </a:solidFill>
                   </a:tcPr>
                 </a:tc>
                 <a:extLst>
@@ -28376,304 +28965,7 @@
 </p:sld>
 </file>
 
-<file path=ppt/slides/slide2.xml><?xml version="1.0" encoding="utf-8"?>
-<p:sld xmlns:a="http://schemas.openxmlformats.org/drawingml/2006/main" xmlns:r="http://schemas.openxmlformats.org/officeDocument/2006/relationships" xmlns:p="http://schemas.openxmlformats.org/presentationml/2006/main">
-  <p:cSld>
-    <p:spTree>
-      <p:nvGrpSpPr>
-        <p:cNvPr id="1" name=""/>
-        <p:cNvGrpSpPr/>
-        <p:nvPr/>
-      </p:nvGrpSpPr>
-      <p:grpSpPr>
-        <a:xfrm>
-          <a:off x="0" y="0"/>
-          <a:ext cx="0" cy="0"/>
-          <a:chOff x="0" y="0"/>
-          <a:chExt cx="0" cy="0"/>
-        </a:xfrm>
-      </p:grpSpPr>
-      <p:sp>
-        <p:nvSpPr>
-          <p:cNvPr id="2" name="Title 1"/>
-          <p:cNvSpPr>
-            <a:spLocks noGrp="1"/>
-          </p:cNvSpPr>
-          <p:nvPr>
-            <p:ph type="title"/>
-          </p:nvPr>
-        </p:nvSpPr>
-        <p:spPr>
-          <a:xfrm>
-            <a:off x="838200" y="365131"/>
-            <a:ext cx="10515600" cy="1051551"/>
-          </a:xfrm>
-        </p:spPr>
-        <p:txBody>
-          <a:bodyPr/>
-          <a:lstStyle/>
-          <a:p>
-            <a:pPr algn="ctr"/>
-            <a:r>
-              <a:rPr lang="en-US" sz="4800" b="1" dirty="0">
-                <a:solidFill>
-                  <a:schemeClr val="tx2">
-                    <a:lumMod val="50000"/>
-                  </a:schemeClr>
-                </a:solidFill>
-                <a:latin typeface="+mn-lt"/>
-              </a:rPr>
-              <a:t>Introduction</a:t>
-            </a:r>
-            <a:r>
-              <a:rPr lang="en-US" b="1" dirty="0" smtClean="0">
-                <a:latin typeface="+mn-lt"/>
-              </a:rPr>
-              <a:t> </a:t>
-            </a:r>
-            <a:endParaRPr lang="en-US" b="1" dirty="0">
-              <a:latin typeface="+mn-lt"/>
-            </a:endParaRPr>
-          </a:p>
-        </p:txBody>
-      </p:sp>
-      <p:sp>
-        <p:nvSpPr>
-          <p:cNvPr id="3" name="Content Placeholder 2"/>
-          <p:cNvSpPr>
-            <a:spLocks noGrp="1"/>
-          </p:cNvSpPr>
-          <p:nvPr>
-            <p:ph idx="1"/>
-          </p:nvPr>
-        </p:nvSpPr>
-        <p:spPr>
-          <a:xfrm>
-            <a:off x="1117600" y="1562100"/>
-            <a:ext cx="9800608" cy="4340857"/>
-          </a:xfrm>
-        </p:spPr>
-        <p:txBody>
-          <a:bodyPr>
-            <a:normAutofit/>
-          </a:bodyPr>
-          <a:lstStyle/>
-          <a:p>
-            <a:pPr algn="just">
-              <a:buFont typeface="Wingdings" panose="05000000000000000000" pitchFamily="2" charset="2"/>
-              <a:buChar char="Ø"/>
-            </a:pPr>
-            <a:r>
-              <a:rPr lang="en-US" dirty="0" smtClean="0"/>
-              <a:t> By this system we can book doctors appointment in </a:t>
-            </a:r>
-            <a:r>
-              <a:rPr lang="en-US" dirty="0" smtClean="0"/>
-              <a:t>anywhere</a:t>
-            </a:r>
-          </a:p>
-          <a:p>
-            <a:pPr marL="0" indent="0" algn="just">
-              <a:buNone/>
-            </a:pPr>
-            <a:r>
-              <a:rPr lang="en-US" dirty="0" smtClean="0"/>
-              <a:t>     </a:t>
-            </a:r>
-            <a:r>
-              <a:rPr lang="en-US" dirty="0" smtClean="0"/>
-              <a:t>in Bangladesh. </a:t>
-            </a:r>
-          </a:p>
-          <a:p>
-            <a:pPr algn="just">
-              <a:buFont typeface="Wingdings" panose="05000000000000000000" pitchFamily="2" charset="2"/>
-              <a:buChar char="Ø"/>
-            </a:pPr>
-            <a:r>
-              <a:rPr lang="en-US" dirty="0" smtClean="0"/>
-              <a:t> By this </a:t>
-            </a:r>
-            <a:r>
-              <a:rPr lang="en-US" dirty="0"/>
-              <a:t>system </a:t>
-            </a:r>
-            <a:r>
-              <a:rPr lang="en-US" dirty="0" smtClean="0"/>
-              <a:t>user can </a:t>
-            </a:r>
-            <a:r>
-              <a:rPr lang="en-US" dirty="0"/>
-              <a:t>able to </a:t>
-            </a:r>
-            <a:r>
-              <a:rPr lang="en-US" dirty="0" smtClean="0"/>
-              <a:t>book </a:t>
-            </a:r>
-            <a:r>
-              <a:rPr lang="en-US" dirty="0"/>
-              <a:t>doctor’s appointment </a:t>
-            </a:r>
-            <a:r>
-              <a:rPr lang="en-US" dirty="0" smtClean="0"/>
-              <a:t>from</a:t>
-            </a:r>
-          </a:p>
-          <a:p>
-            <a:pPr marL="0" indent="0" algn="just">
-              <a:buNone/>
-            </a:pPr>
-            <a:r>
-              <a:rPr lang="en-US" dirty="0"/>
-              <a:t> </a:t>
-            </a:r>
-            <a:r>
-              <a:rPr lang="en-US" dirty="0" smtClean="0"/>
-              <a:t>   </a:t>
-            </a:r>
-            <a:r>
-              <a:rPr lang="en-US" dirty="0" smtClean="0"/>
-              <a:t> </a:t>
-            </a:r>
-            <a:r>
-              <a:rPr lang="en-US" dirty="0" smtClean="0"/>
-              <a:t>nearest </a:t>
-            </a:r>
-            <a:r>
-              <a:rPr lang="en-US" dirty="0"/>
-              <a:t>doctor’s chamber. </a:t>
-            </a:r>
-            <a:endParaRPr lang="en-US" dirty="0" smtClean="0"/>
-          </a:p>
-          <a:p>
-            <a:pPr algn="just">
-              <a:buFont typeface="Wingdings" panose="05000000000000000000" pitchFamily="2" charset="2"/>
-              <a:buChar char="Ø"/>
-            </a:pPr>
-            <a:r>
-              <a:rPr lang="en-US" dirty="0" smtClean="0"/>
-              <a:t> By this system user can able to find doctor based on </a:t>
-            </a:r>
-            <a:r>
-              <a:rPr lang="en-US" dirty="0" smtClean="0"/>
-              <a:t>users</a:t>
-            </a:r>
-          </a:p>
-          <a:p>
-            <a:pPr marL="0" indent="0" algn="just">
-              <a:buNone/>
-            </a:pPr>
-            <a:r>
-              <a:rPr lang="en-US" dirty="0" smtClean="0"/>
-              <a:t>     </a:t>
-            </a:r>
-            <a:r>
-              <a:rPr lang="en-US" dirty="0" smtClean="0"/>
-              <a:t>location. </a:t>
-            </a:r>
-          </a:p>
-          <a:p>
-            <a:pPr algn="just">
-              <a:buFont typeface="Wingdings" panose="05000000000000000000" pitchFamily="2" charset="2"/>
-              <a:buChar char="Ø"/>
-            </a:pPr>
-            <a:r>
-              <a:rPr lang="en-US" dirty="0"/>
-              <a:t> </a:t>
-            </a:r>
-            <a:r>
-              <a:rPr lang="en-US" dirty="0" smtClean="0"/>
-              <a:t>Doctor can follow patient’s condition by this system.</a:t>
-            </a:r>
-          </a:p>
-          <a:p>
-            <a:pPr algn="just">
-              <a:buFont typeface="Wingdings" panose="05000000000000000000" pitchFamily="2" charset="2"/>
-              <a:buChar char="Ø"/>
-            </a:pPr>
-            <a:r>
-              <a:rPr lang="en-US" dirty="0" smtClean="0"/>
-              <a:t> This system can store patient information for farther use.</a:t>
-            </a:r>
-            <a:endParaRPr lang="en-US" dirty="0"/>
-          </a:p>
-        </p:txBody>
-      </p:sp>
-      <p:sp>
-        <p:nvSpPr>
-          <p:cNvPr id="5" name="Footer Placeholder 4"/>
-          <p:cNvSpPr>
-            <a:spLocks noGrp="1"/>
-          </p:cNvSpPr>
-          <p:nvPr>
-            <p:ph type="ftr" sz="quarter" idx="11"/>
-          </p:nvPr>
-        </p:nvSpPr>
-        <p:spPr/>
-        <p:txBody>
-          <a:bodyPr/>
-          <a:lstStyle/>
-          <a:p>
-            <a:endParaRPr lang="en-US"/>
-          </a:p>
-        </p:txBody>
-      </p:sp>
-      <p:sp>
-        <p:nvSpPr>
-          <p:cNvPr id="4" name="Slide Number Placeholder 3"/>
-          <p:cNvSpPr>
-            <a:spLocks noGrp="1"/>
-          </p:cNvSpPr>
-          <p:nvPr>
-            <p:ph type="sldNum" sz="quarter" idx="12"/>
-          </p:nvPr>
-        </p:nvSpPr>
-        <p:spPr/>
-        <p:txBody>
-          <a:bodyPr/>
-          <a:lstStyle/>
-          <a:p>
-            <a:fld id="{12DFE2B3-9440-4CDE-AF16-9399CD8558BB}" type="slidenum">
-              <a:rPr lang="en-US" smtClean="0"/>
-              <a:t>2</a:t>
-            </a:fld>
-            <a:endParaRPr lang="en-US"/>
-          </a:p>
-        </p:txBody>
-      </p:sp>
-    </p:spTree>
-    <p:extLst>
-      <p:ext uri="{BB962C8B-B14F-4D97-AF65-F5344CB8AC3E}">
-        <p14:creationId xmlns:p14="http://schemas.microsoft.com/office/powerpoint/2010/main" val="142213943"/>
-      </p:ext>
-    </p:extLst>
-  </p:cSld>
-  <p:clrMapOvr>
-    <a:masterClrMapping/>
-  </p:clrMapOvr>
-  <mc:AlternateContent xmlns:mc="http://schemas.openxmlformats.org/markup-compatibility/2006" xmlns:p14="http://schemas.microsoft.com/office/powerpoint/2010/main">
-    <mc:Choice Requires="p14">
-      <p:transition p14:dur="250" advClick="0">
-        <p14:gallery dir="l"/>
-      </p:transition>
-    </mc:Choice>
-    <mc:Fallback xmlns="">
-      <p:transition advClick="0">
-        <p:fade/>
-      </p:transition>
-    </mc:Fallback>
-  </mc:AlternateContent>
-  <p:timing>
-    <p:tnLst>
-      <p:par>
-        <p:cTn id="1" dur="indefinite" restart="never" nodeType="tmRoot"/>
-      </p:par>
-    </p:tnLst>
-  </p:timing>
-</p:sld>
-</file>
-
-<file path=ppt/slides/slide20.xml><?xml version="1.0" encoding="utf-8"?>
+<file path=ppt/slides/slide21.xml><?xml version="1.0" encoding="utf-8"?>
 <p:sld xmlns:a="http://schemas.openxmlformats.org/drawingml/2006/main" xmlns:r="http://schemas.openxmlformats.org/officeDocument/2006/relationships" xmlns:p="http://schemas.openxmlformats.org/presentationml/2006/main">
   <p:cSld>
     <p:spTree>
@@ -28742,7 +29034,7 @@
           <a:p>
             <a:fld id="{12DFE2B3-9440-4CDE-AF16-9399CD8558BB}" type="slidenum">
               <a:rPr lang="en-US" smtClean="0"/>
-              <a:t>20</a:t>
+              <a:t>21</a:t>
             </a:fld>
             <a:endParaRPr lang="en-US"/>
           </a:p>
@@ -28757,7 +29049,7 @@
           <p:nvPr>
             <p:extLst>
               <p:ext uri="{D42A27DB-BD31-4B8C-83A1-F6EECF244321}">
-                <p14:modId xmlns:p14="http://schemas.microsoft.com/office/powerpoint/2010/main" val="3062786636"/>
+                <p14:modId xmlns:p14="http://schemas.microsoft.com/office/powerpoint/2010/main" val="179715899"/>
               </p:ext>
             </p:extLst>
           </p:nvPr>
@@ -29189,7 +29481,12 @@
                       <a:headEnd type="none" w="med" len="med"/>
                       <a:tailEnd type="none" w="med" len="med"/>
                     </a:lnB>
-                    <a:noFill/>
+                    <a:solidFill>
+                      <a:schemeClr val="accent2">
+                        <a:lumMod val="20000"/>
+                        <a:lumOff val="80000"/>
+                      </a:schemeClr>
+                    </a:solidFill>
                   </a:tcPr>
                 </a:tc>
                 <a:tc>
@@ -29266,7 +29563,12 @@
                       <a:headEnd type="none" w="med" len="med"/>
                       <a:tailEnd type="none" w="med" len="med"/>
                     </a:lnB>
-                    <a:noFill/>
+                    <a:solidFill>
+                      <a:schemeClr val="accent2">
+                        <a:lumMod val="20000"/>
+                        <a:lumOff val="80000"/>
+                      </a:schemeClr>
+                    </a:solidFill>
                   </a:tcPr>
                 </a:tc>
                 <a:tc>
@@ -29342,7 +29644,12 @@
                       <a:headEnd type="none" w="med" len="med"/>
                       <a:tailEnd type="none" w="med" len="med"/>
                     </a:lnB>
-                    <a:noFill/>
+                    <a:solidFill>
+                      <a:schemeClr val="accent2">
+                        <a:lumMod val="20000"/>
+                        <a:lumOff val="80000"/>
+                      </a:schemeClr>
+                    </a:solidFill>
                   </a:tcPr>
                 </a:tc>
                 <a:tc>
@@ -29399,7 +29706,12 @@
                       <a:headEnd type="none" w="med" len="med"/>
                       <a:tailEnd type="none" w="med" len="med"/>
                     </a:lnB>
-                    <a:noFill/>
+                    <a:solidFill>
+                      <a:schemeClr val="accent2">
+                        <a:lumMod val="20000"/>
+                        <a:lumOff val="80000"/>
+                      </a:schemeClr>
+                    </a:solidFill>
                   </a:tcPr>
                 </a:tc>
                 <a:extLst>
@@ -29478,7 +29790,12 @@
                       <a:headEnd type="none" w="med" len="med"/>
                       <a:tailEnd type="none" w="med" len="med"/>
                     </a:lnB>
-                    <a:noFill/>
+                    <a:solidFill>
+                      <a:schemeClr val="accent2">
+                        <a:lumMod val="20000"/>
+                        <a:lumOff val="80000"/>
+                      </a:schemeClr>
+                    </a:solidFill>
                   </a:tcPr>
                 </a:tc>
                 <a:tc>
@@ -29555,7 +29872,12 @@
                       <a:headEnd type="none" w="med" len="med"/>
                       <a:tailEnd type="none" w="med" len="med"/>
                     </a:lnB>
-                    <a:noFill/>
+                    <a:solidFill>
+                      <a:schemeClr val="accent2">
+                        <a:lumMod val="20000"/>
+                        <a:lumOff val="80000"/>
+                      </a:schemeClr>
+                    </a:solidFill>
                   </a:tcPr>
                 </a:tc>
                 <a:tc>
@@ -29631,7 +29953,12 @@
                       <a:headEnd type="none" w="med" len="med"/>
                       <a:tailEnd type="none" w="med" len="med"/>
                     </a:lnB>
-                    <a:noFill/>
+                    <a:solidFill>
+                      <a:schemeClr val="accent2">
+                        <a:lumMod val="20000"/>
+                        <a:lumOff val="80000"/>
+                      </a:schemeClr>
+                    </a:solidFill>
                   </a:tcPr>
                 </a:tc>
                 <a:tc>
@@ -29688,7 +30015,12 @@
                       <a:headEnd type="none" w="med" len="med"/>
                       <a:tailEnd type="none" w="med" len="med"/>
                     </a:lnB>
-                    <a:noFill/>
+                    <a:solidFill>
+                      <a:schemeClr val="accent2">
+                        <a:lumMod val="20000"/>
+                        <a:lumOff val="80000"/>
+                      </a:schemeClr>
+                    </a:solidFill>
                   </a:tcPr>
                 </a:tc>
                 <a:extLst>
@@ -29767,7 +30099,12 @@
                       <a:headEnd type="none" w="med" len="med"/>
                       <a:tailEnd type="none" w="med" len="med"/>
                     </a:lnB>
-                    <a:noFill/>
+                    <a:solidFill>
+                      <a:schemeClr val="accent2">
+                        <a:lumMod val="20000"/>
+                        <a:lumOff val="80000"/>
+                      </a:schemeClr>
+                    </a:solidFill>
                   </a:tcPr>
                 </a:tc>
                 <a:tc>
@@ -29868,7 +30205,12 @@
                       <a:headEnd type="none" w="med" len="med"/>
                       <a:tailEnd type="none" w="med" len="med"/>
                     </a:lnB>
-                    <a:noFill/>
+                    <a:solidFill>
+                      <a:schemeClr val="accent2">
+                        <a:lumMod val="20000"/>
+                        <a:lumOff val="80000"/>
+                      </a:schemeClr>
+                    </a:solidFill>
                   </a:tcPr>
                 </a:tc>
                 <a:tc>
@@ -29944,7 +30286,12 @@
                       <a:headEnd type="none" w="med" len="med"/>
                       <a:tailEnd type="none" w="med" len="med"/>
                     </a:lnB>
-                    <a:noFill/>
+                    <a:solidFill>
+                      <a:schemeClr val="accent2">
+                        <a:lumMod val="20000"/>
+                        <a:lumOff val="80000"/>
+                      </a:schemeClr>
+                    </a:solidFill>
                   </a:tcPr>
                 </a:tc>
                 <a:tc>
@@ -29997,7 +30344,12 @@
                       <a:headEnd type="none" w="med" len="med"/>
                       <a:tailEnd type="none" w="med" len="med"/>
                     </a:lnB>
-                    <a:noFill/>
+                    <a:solidFill>
+                      <a:schemeClr val="accent2">
+                        <a:lumMod val="20000"/>
+                        <a:lumOff val="80000"/>
+                      </a:schemeClr>
+                    </a:solidFill>
                   </a:tcPr>
                 </a:tc>
                 <a:extLst>
@@ -30070,7 +30422,12 @@
                       <a:headEnd type="none" w="med" len="med"/>
                       <a:tailEnd type="none" w="med" len="med"/>
                     </a:lnB>
-                    <a:noFill/>
+                    <a:solidFill>
+                      <a:schemeClr val="accent2">
+                        <a:lumMod val="20000"/>
+                        <a:lumOff val="80000"/>
+                      </a:schemeClr>
+                    </a:solidFill>
                   </a:tcPr>
                 </a:tc>
                 <a:tc>
@@ -30147,7 +30504,12 @@
                       <a:headEnd type="none" w="med" len="med"/>
                       <a:tailEnd type="none" w="med" len="med"/>
                     </a:lnB>
-                    <a:noFill/>
+                    <a:solidFill>
+                      <a:schemeClr val="accent2">
+                        <a:lumMod val="20000"/>
+                        <a:lumOff val="80000"/>
+                      </a:schemeClr>
+                    </a:solidFill>
                   </a:tcPr>
                 </a:tc>
                 <a:tc>
@@ -30223,7 +30585,12 @@
                       <a:headEnd type="none" w="med" len="med"/>
                       <a:tailEnd type="none" w="med" len="med"/>
                     </a:lnB>
-                    <a:noFill/>
+                    <a:solidFill>
+                      <a:schemeClr val="accent2">
+                        <a:lumMod val="20000"/>
+                        <a:lumOff val="80000"/>
+                      </a:schemeClr>
+                    </a:solidFill>
                   </a:tcPr>
                 </a:tc>
                 <a:tc>
@@ -30276,7 +30643,12 @@
                       <a:headEnd type="none" w="med" len="med"/>
                       <a:tailEnd type="none" w="med" len="med"/>
                     </a:lnB>
-                    <a:noFill/>
+                    <a:solidFill>
+                      <a:schemeClr val="accent2">
+                        <a:lumMod val="20000"/>
+                        <a:lumOff val="80000"/>
+                      </a:schemeClr>
+                    </a:solidFill>
                   </a:tcPr>
                 </a:tc>
                 <a:extLst>
@@ -30321,7 +30693,7 @@
 </p:sld>
 </file>
 
-<file path=ppt/slides/slide21.xml><?xml version="1.0" encoding="utf-8"?>
+<file path=ppt/slides/slide22.xml><?xml version="1.0" encoding="utf-8"?>
 <p:sld xmlns:a="http://schemas.openxmlformats.org/drawingml/2006/main" xmlns:r="http://schemas.openxmlformats.org/officeDocument/2006/relationships" xmlns:p="http://schemas.openxmlformats.org/presentationml/2006/main">
   <p:cSld>
     <p:spTree>
@@ -30429,7 +30801,7 @@
           <a:p>
             <a:fld id="{12DFE2B3-9440-4CDE-AF16-9399CD8558BB}" type="slidenum">
               <a:rPr lang="en-US" smtClean="0"/>
-              <a:t>21</a:t>
+              <a:t>22</a:t>
             </a:fld>
             <a:endParaRPr lang="en-US"/>
           </a:p>
@@ -30444,13 +30816,13 @@
           <p:nvPr>
             <p:extLst>
               <p:ext uri="{D42A27DB-BD31-4B8C-83A1-F6EECF244321}">
-                <p14:modId xmlns:p14="http://schemas.microsoft.com/office/powerpoint/2010/main" val="2667108368"/>
+                <p14:modId xmlns:p14="http://schemas.microsoft.com/office/powerpoint/2010/main" val="356963323"/>
               </p:ext>
             </p:extLst>
           </p:nvPr>
         </p:nvGraphicFramePr>
         <p:xfrm>
-          <a:off x="977900" y="1690688"/>
+          <a:off x="1111250" y="1538288"/>
           <a:ext cx="9969500" cy="3993852"/>
         </p:xfrm>
         <a:graphic>
@@ -31043,7 +31415,12 @@
                       <a:headEnd type="none" w="med" len="med"/>
                       <a:tailEnd type="none" w="med" len="med"/>
                     </a:lnB>
-                    <a:noFill/>
+                    <a:solidFill>
+                      <a:schemeClr val="tx2">
+                        <a:lumMod val="40000"/>
+                        <a:lumOff val="60000"/>
+                      </a:schemeClr>
+                    </a:solidFill>
                   </a:tcPr>
                 </a:tc>
                 <a:tc>
@@ -31483,7 +31860,12 @@
                       <a:headEnd type="none" w="med" len="med"/>
                       <a:tailEnd type="none" w="med" len="med"/>
                     </a:lnB>
-                    <a:noFill/>
+                    <a:solidFill>
+                      <a:schemeClr val="tx2">
+                        <a:lumMod val="40000"/>
+                        <a:lumOff val="60000"/>
+                      </a:schemeClr>
+                    </a:solidFill>
                   </a:tcPr>
                 </a:tc>
                 <a:tc>
@@ -31738,7 +32120,12 @@
                       <a:headEnd type="none" w="med" len="med"/>
                       <a:tailEnd type="none" w="med" len="med"/>
                     </a:lnB>
-                    <a:noFill/>
+                    <a:solidFill>
+                      <a:schemeClr val="tx2">
+                        <a:lumMod val="40000"/>
+                        <a:lumOff val="60000"/>
+                      </a:schemeClr>
+                    </a:solidFill>
                   </a:tcPr>
                 </a:tc>
                 <a:tc>
@@ -31972,7 +32359,12 @@
                       <a:headEnd type="none" w="med" len="med"/>
                       <a:tailEnd type="none" w="med" len="med"/>
                     </a:lnB>
-                    <a:noFill/>
+                    <a:solidFill>
+                      <a:schemeClr val="tx2">
+                        <a:lumMod val="40000"/>
+                        <a:lumOff val="60000"/>
+                      </a:schemeClr>
+                    </a:solidFill>
                   </a:tcPr>
                 </a:tc>
                 <a:extLst>
@@ -32017,7 +32409,7 @@
 </p:sld>
 </file>
 
-<file path=ppt/slides/slide22.xml><?xml version="1.0" encoding="utf-8"?>
+<file path=ppt/slides/slide23.xml><?xml version="1.0" encoding="utf-8"?>
 <p:sld xmlns:a="http://schemas.openxmlformats.org/drawingml/2006/main" xmlns:r="http://schemas.openxmlformats.org/officeDocument/2006/relationships" xmlns:p="http://schemas.openxmlformats.org/presentationml/2006/main">
   <p:cSld>
     <p:spTree>
@@ -32106,7 +32498,7 @@
           <a:p>
             <a:fld id="{12DFE2B3-9440-4CDE-AF16-9399CD8558BB}" type="slidenum">
               <a:rPr lang="en-US" smtClean="0"/>
-              <a:t>22</a:t>
+              <a:t>23</a:t>
             </a:fld>
             <a:endParaRPr lang="en-US"/>
           </a:p>
@@ -32121,7 +32513,7 @@
           <p:nvPr>
             <p:extLst>
               <p:ext uri="{D42A27DB-BD31-4B8C-83A1-F6EECF244321}">
-                <p14:modId xmlns:p14="http://schemas.microsoft.com/office/powerpoint/2010/main" val="2243764513"/>
+                <p14:modId xmlns:p14="http://schemas.microsoft.com/office/powerpoint/2010/main" val="3612631015"/>
               </p:ext>
             </p:extLst>
           </p:nvPr>
@@ -32717,7 +33109,12 @@
                       <a:headEnd type="none" w="med" len="med"/>
                       <a:tailEnd type="none" w="med" len="med"/>
                     </a:lnB>
-                    <a:noFill/>
+                    <a:solidFill>
+                      <a:schemeClr val="tx2">
+                        <a:lumMod val="40000"/>
+                        <a:lumOff val="60000"/>
+                      </a:schemeClr>
+                    </a:solidFill>
                   </a:tcPr>
                 </a:tc>
                 <a:tc>
@@ -33177,7 +33574,12 @@
                       <a:headEnd type="none" w="med" len="med"/>
                       <a:tailEnd type="none" w="med" len="med"/>
                     </a:lnB>
-                    <a:noFill/>
+                    <a:solidFill>
+                      <a:schemeClr val="tx2">
+                        <a:lumMod val="40000"/>
+                        <a:lumOff val="60000"/>
+                      </a:schemeClr>
+                    </a:solidFill>
                   </a:tcPr>
                 </a:tc>
                 <a:tc>
@@ -33422,7 +33824,12 @@
                       <a:headEnd type="none" w="med" len="med"/>
                       <a:tailEnd type="none" w="med" len="med"/>
                     </a:lnB>
-                    <a:noFill/>
+                    <a:solidFill>
+                      <a:schemeClr val="tx2">
+                        <a:lumMod val="40000"/>
+                        <a:lumOff val="60000"/>
+                      </a:schemeClr>
+                    </a:solidFill>
                   </a:tcPr>
                 </a:tc>
                 <a:tc>
@@ -33638,7 +34045,12 @@
                       <a:headEnd type="none" w="med" len="med"/>
                       <a:tailEnd type="none" w="med" len="med"/>
                     </a:lnB>
-                    <a:noFill/>
+                    <a:solidFill>
+                      <a:schemeClr val="tx2">
+                        <a:lumMod val="40000"/>
+                        <a:lumOff val="60000"/>
+                      </a:schemeClr>
+                    </a:solidFill>
                   </a:tcPr>
                 </a:tc>
                 <a:extLst>
@@ -33683,7 +34095,7 @@
 </p:sld>
 </file>
 
-<file path=ppt/slides/slide23.xml><?xml version="1.0" encoding="utf-8"?>
+<file path=ppt/slides/slide24.xml><?xml version="1.0" encoding="utf-8"?>
 <p:sld xmlns:a="http://schemas.openxmlformats.org/drawingml/2006/main" xmlns:r="http://schemas.openxmlformats.org/officeDocument/2006/relationships" xmlns:p="http://schemas.openxmlformats.org/presentationml/2006/main">
   <p:cSld>
     <p:spTree>
@@ -33757,7 +34169,7 @@
           <a:p>
             <a:fld id="{12DFE2B3-9440-4CDE-AF16-9399CD8558BB}" type="slidenum">
               <a:rPr lang="en-US" smtClean="0"/>
-              <a:t>23</a:t>
+              <a:t>24</a:t>
             </a:fld>
             <a:endParaRPr lang="en-US"/>
           </a:p>
@@ -33772,14 +34184,14 @@
           <p:nvPr>
             <p:extLst>
               <p:ext uri="{D42A27DB-BD31-4B8C-83A1-F6EECF244321}">
-                <p14:modId xmlns:p14="http://schemas.microsoft.com/office/powerpoint/2010/main" val="1710578805"/>
+                <p14:modId xmlns:p14="http://schemas.microsoft.com/office/powerpoint/2010/main" val="2159818924"/>
               </p:ext>
             </p:extLst>
           </p:nvPr>
         </p:nvGraphicFramePr>
         <p:xfrm>
-          <a:off x="1206500" y="1944689"/>
-          <a:ext cx="9779000" cy="2868612"/>
+          <a:off x="1168400" y="1944689"/>
+          <a:ext cx="9817100" cy="2868612"/>
         </p:xfrm>
         <a:graphic>
           <a:graphicData uri="http://schemas.openxmlformats.org/drawingml/2006/table">
@@ -33788,7 +34200,7 @@
                 <a:tableStyleId>{5C22544A-7EE6-4342-B048-85BDC9FD1C3A}</a:tableStyleId>
               </a:tblPr>
               <a:tblGrid>
-                <a:gridCol w="2870200">
+                <a:gridCol w="2908300">
                   <a:extLst>
                     <a:ext uri="{9D8B030D-6E8A-4147-A177-3AD203B41FA5}">
                       <a16:colId xmlns:a16="http://schemas.microsoft.com/office/drawing/2014/main" val="4203867277"/>
@@ -34354,7 +34766,12 @@
                       <a:headEnd type="none" w="med" len="med"/>
                       <a:tailEnd type="none" w="med" len="med"/>
                     </a:lnB>
-                    <a:noFill/>
+                    <a:solidFill>
+                      <a:schemeClr val="accent5">
+                        <a:lumMod val="40000"/>
+                        <a:lumOff val="60000"/>
+                      </a:schemeClr>
+                    </a:solidFill>
                   </a:tcPr>
                 </a:tc>
                 <a:tc>
@@ -34614,7 +35031,12 @@
                       <a:headEnd type="none" w="med" len="med"/>
                       <a:tailEnd type="none" w="med" len="med"/>
                     </a:lnB>
-                    <a:noFill/>
+                    <a:solidFill>
+                      <a:schemeClr val="accent5">
+                        <a:lumMod val="40000"/>
+                        <a:lumOff val="60000"/>
+                      </a:schemeClr>
+                    </a:solidFill>
                   </a:tcPr>
                 </a:tc>
                 <a:tc>
@@ -34818,7 +35240,12 @@
                       <a:headEnd type="none" w="med" len="med"/>
                       <a:tailEnd type="none" w="med" len="med"/>
                     </a:lnB>
-                    <a:noFill/>
+                    <a:solidFill>
+                      <a:schemeClr val="accent5">
+                        <a:lumMod val="40000"/>
+                        <a:lumOff val="60000"/>
+                      </a:schemeClr>
+                    </a:solidFill>
                   </a:tcPr>
                 </a:tc>
                 <a:tc>
@@ -35006,7 +35433,12 @@
                       <a:headEnd type="none" w="med" len="med"/>
                       <a:tailEnd type="none" w="med" len="med"/>
                     </a:lnB>
-                    <a:noFill/>
+                    <a:solidFill>
+                      <a:schemeClr val="accent5">
+                        <a:lumMod val="40000"/>
+                        <a:lumOff val="60000"/>
+                      </a:schemeClr>
+                    </a:solidFill>
                   </a:tcPr>
                 </a:tc>
                 <a:extLst>
@@ -35042,7 +35474,7 @@
 </p:sld>
 </file>
 
-<file path=ppt/slides/slide24.xml><?xml version="1.0" encoding="utf-8"?>
+<file path=ppt/slides/slide25.xml><?xml version="1.0" encoding="utf-8"?>
 <p:sld xmlns:a="http://schemas.openxmlformats.org/drawingml/2006/main" xmlns:r="http://schemas.openxmlformats.org/officeDocument/2006/relationships" xmlns:p="http://schemas.openxmlformats.org/presentationml/2006/main">
   <p:cSld>
     <p:spTree>
@@ -35135,7 +35567,7 @@
           <a:p>
             <a:fld id="{12DFE2B3-9440-4CDE-AF16-9399CD8558BB}" type="slidenum">
               <a:rPr lang="en-US" smtClean="0"/>
-              <a:t>24</a:t>
+              <a:t>25</a:t>
             </a:fld>
             <a:endParaRPr lang="en-US"/>
           </a:p>
@@ -35150,7 +35582,7 @@
           <p:nvPr>
             <p:extLst>
               <p:ext uri="{D42A27DB-BD31-4B8C-83A1-F6EECF244321}">
-                <p14:modId xmlns:p14="http://schemas.microsoft.com/office/powerpoint/2010/main" val="1794703026"/>
+                <p14:modId xmlns:p14="http://schemas.microsoft.com/office/powerpoint/2010/main" val="2459756487"/>
               </p:ext>
             </p:extLst>
           </p:nvPr>
@@ -35785,7 +36217,12 @@
                       <a:headEnd type="none" w="med" len="med"/>
                       <a:tailEnd type="none" w="med" len="med"/>
                     </a:lnB>
-                    <a:noFill/>
+                    <a:solidFill>
+                      <a:schemeClr val="accent5">
+                        <a:lumMod val="40000"/>
+                        <a:lumOff val="60000"/>
+                      </a:schemeClr>
+                    </a:solidFill>
                   </a:tcPr>
                 </a:tc>
                 <a:tc>
@@ -36054,7 +36491,12 @@
                       <a:headEnd type="none" w="med" len="med"/>
                       <a:tailEnd type="none" w="med" len="med"/>
                     </a:lnB>
-                    <a:noFill/>
+                    <a:solidFill>
+                      <a:schemeClr val="accent5">
+                        <a:lumMod val="40000"/>
+                        <a:lumOff val="60000"/>
+                      </a:schemeClr>
+                    </a:solidFill>
                   </a:tcPr>
                 </a:tc>
                 <a:tc>
@@ -36271,7 +36713,12 @@
                       <a:headEnd type="none" w="med" len="med"/>
                       <a:tailEnd type="none" w="med" len="med"/>
                     </a:lnB>
-                    <a:noFill/>
+                    <a:solidFill>
+                      <a:schemeClr val="accent5">
+                        <a:lumMod val="40000"/>
+                        <a:lumOff val="60000"/>
+                      </a:schemeClr>
+                    </a:solidFill>
                   </a:tcPr>
                 </a:tc>
                 <a:tc>
@@ -36459,7 +36906,12 @@
                       <a:headEnd type="none" w="med" len="med"/>
                       <a:tailEnd type="none" w="med" len="med"/>
                     </a:lnB>
-                    <a:noFill/>
+                    <a:solidFill>
+                      <a:schemeClr val="accent5">
+                        <a:lumMod val="40000"/>
+                        <a:lumOff val="60000"/>
+                      </a:schemeClr>
+                    </a:solidFill>
                   </a:tcPr>
                 </a:tc>
                 <a:extLst>
@@ -36504,7 +36956,7 @@
 </p:sld>
 </file>
 
-<file path=ppt/slides/slide25.xml><?xml version="1.0" encoding="utf-8"?>
+<file path=ppt/slides/slide26.xml><?xml version="1.0" encoding="utf-8"?>
 <p:sld xmlns:a="http://schemas.openxmlformats.org/drawingml/2006/main" xmlns:r="http://schemas.openxmlformats.org/officeDocument/2006/relationships" xmlns:p="http://schemas.openxmlformats.org/presentationml/2006/main">
   <p:cSld>
     <p:spTree>
@@ -36578,12 +37030,14 @@
         </p:nvSpPr>
         <p:spPr>
           <a:xfrm>
-            <a:off x="177800" y="1473200"/>
-            <a:ext cx="10477500" cy="4170363"/>
+            <a:off x="177800" y="1539433"/>
+            <a:ext cx="10477500" cy="4104130"/>
           </a:xfrm>
         </p:spPr>
         <p:txBody>
-          <a:bodyPr/>
+          <a:bodyPr>
+            <a:normAutofit/>
+          </a:bodyPr>
           <a:lstStyle/>
           <a:p>
             <a:pPr lvl="4">
@@ -36592,11 +37046,7 @@
             </a:pPr>
             <a:r>
               <a:rPr lang="en-US" sz="2800" dirty="0" smtClean="0"/>
-              <a:t> </a:t>
-            </a:r>
-            <a:r>
-              <a:rPr lang="en-US" sz="2800" dirty="0" smtClean="0"/>
-              <a:t>This web base system help the people to book</a:t>
+              <a:t> This web base system help the people to book</a:t>
             </a:r>
           </a:p>
           <a:p>
@@ -36653,15 +37103,26 @@
             </a:pPr>
             <a:r>
               <a:rPr lang="en-US" sz="2800" dirty="0" smtClean="0"/>
-              <a:t> This system is develop across in our country. </a:t>
+              <a:t> This system is develop across in our country</a:t>
             </a:r>
-            <a:endParaRPr lang="en-US" sz="2800" dirty="0" smtClean="0"/>
+            <a:r>
+              <a:rPr lang="en-US" sz="2800" dirty="0" smtClean="0"/>
+              <a:t>.</a:t>
+            </a:r>
           </a:p>
           <a:p>
-            <a:pPr marL="1828800" lvl="4" indent="0">
-              <a:buNone/>
+            <a:pPr lvl="4">
+              <a:buFont typeface="Wingdings" panose="05000000000000000000" pitchFamily="2" charset="2"/>
+              <a:buChar char="Ø"/>
             </a:pPr>
-            <a:endParaRPr lang="en-US" sz="2800" dirty="0" smtClean="0"/>
+            <a:r>
+              <a:rPr lang="en-US" sz="2800" dirty="0" smtClean="0"/>
+              <a:t> Future Work </a:t>
+            </a:r>
+            <a:r>
+              <a:rPr lang="en-US" sz="2800" dirty="0" smtClean="0"/>
+              <a:t> </a:t>
+            </a:r>
           </a:p>
           <a:p>
             <a:pPr marL="1828800" lvl="4" indent="0">
@@ -36677,13 +37138,8 @@
                   <a:srgbClr val="002060"/>
                 </a:solidFill>
               </a:rPr>
-              <a:t>Future Work </a:t>
+              <a:t> </a:t>
             </a:r>
-            <a:endParaRPr lang="en-US" sz="4400" b="1" dirty="0" smtClean="0">
-              <a:solidFill>
-                <a:srgbClr val="002060"/>
-              </a:solidFill>
-            </a:endParaRPr>
           </a:p>
           <a:p>
             <a:pPr marL="1828800" lvl="4" indent="0">
@@ -36730,7 +37186,7 @@
           <a:p>
             <a:fld id="{12DFE2B3-9440-4CDE-AF16-9399CD8558BB}" type="slidenum">
               <a:rPr lang="en-US" smtClean="0"/>
-              <a:t>25</a:t>
+              <a:t>26</a:t>
             </a:fld>
             <a:endParaRPr lang="en-US"/>
           </a:p>
@@ -36746,13 +37202,13 @@
   <p:clrMapOvr>
     <a:masterClrMapping/>
   </p:clrMapOvr>
-  <mc:AlternateContent xmlns:mc="http://schemas.openxmlformats.org/markup-compatibility/2006">
-    <mc:Choice xmlns:p14="http://schemas.microsoft.com/office/powerpoint/2010/main" Requires="p14">
+  <mc:AlternateContent xmlns:mc="http://schemas.openxmlformats.org/markup-compatibility/2006" xmlns:p14="http://schemas.microsoft.com/office/powerpoint/2010/main">
+    <mc:Choice Requires="p14">
       <p:transition p14:dur="250" advClick="0">
         <p14:prism isInverted="1"/>
       </p:transition>
     </mc:Choice>
-    <mc:Fallback>
+    <mc:Fallback xmlns="">
       <p:transition advClick="0">
         <p:fade/>
       </p:transition>
@@ -36984,7 +37440,7 @@
         </p:spPr>
         <p:txBody>
           <a:bodyPr>
-            <a:normAutofit fontScale="92500" lnSpcReduction="10000"/>
+            <a:normAutofit fontScale="92500"/>
           </a:bodyPr>
           <a:lstStyle/>
           <a:p>
@@ -36998,15 +37454,7 @@
             </a:r>
             <a:r>
               <a:rPr lang="en-US" dirty="0" smtClean="0"/>
-              <a:t>People </a:t>
-            </a:r>
-            <a:r>
-              <a:rPr lang="en-US" dirty="0" smtClean="0"/>
-              <a:t>don’t know where &amp; when they book </a:t>
-            </a:r>
-            <a:r>
-              <a:rPr lang="en-US" dirty="0" smtClean="0"/>
-              <a:t>appropriate</a:t>
+              <a:t>People don’t know where &amp; when they book appropriate</a:t>
             </a:r>
           </a:p>
           <a:p>
@@ -37019,15 +37467,7 @@
             </a:r>
             <a:r>
               <a:rPr lang="en-US" dirty="0" smtClean="0"/>
-              <a:t>   </a:t>
-            </a:r>
-            <a:r>
-              <a:rPr lang="en-US" dirty="0" smtClean="0"/>
-              <a:t>doctor’s </a:t>
-            </a:r>
-            <a:r>
-              <a:rPr lang="en-US" dirty="0" smtClean="0"/>
-              <a:t>appointment .  </a:t>
+              <a:t>   doctor’s appointment .  </a:t>
             </a:r>
           </a:p>
           <a:p>
@@ -37052,7 +37492,7 @@
             </a:pPr>
             <a:r>
               <a:rPr lang="en-US" dirty="0" smtClean="0"/>
-              <a:t> Increasing patient </a:t>
+              <a:t>Patients have to wait long time for doctors appointment</a:t>
             </a:r>
           </a:p>
           <a:p>
@@ -37062,21 +37502,7 @@
             </a:pPr>
             <a:r>
               <a:rPr lang="en-US" dirty="0" smtClean="0"/>
-              <a:t> Patients have to wait long time for doctors appointment</a:t>
-            </a:r>
-          </a:p>
-          <a:p>
-            <a:pPr>
-              <a:buFont typeface="Wingdings" panose="05000000000000000000" pitchFamily="2" charset="2"/>
-              <a:buChar char="Ø"/>
-            </a:pPr>
-            <a:r>
-              <a:rPr lang="en-US" dirty="0" smtClean="0"/>
-              <a:t> Sometime a patient can not get appointment in the </a:t>
-            </a:r>
-            <a:r>
-              <a:rPr lang="en-US" dirty="0" smtClean="0"/>
-              <a:t>nearest</a:t>
+              <a:t> Sometime a patient can not get appointment in the nearest</a:t>
             </a:r>
           </a:p>
           <a:p>
@@ -37089,15 +37515,7 @@
             </a:r>
             <a:r>
               <a:rPr lang="en-US" dirty="0" smtClean="0"/>
-              <a:t>  </a:t>
-            </a:r>
-            <a:r>
-              <a:rPr lang="en-US" dirty="0" smtClean="0"/>
-              <a:t>  </a:t>
-            </a:r>
-            <a:r>
-              <a:rPr lang="en-US" dirty="0" smtClean="0"/>
-              <a:t>hospital or the nearest doctor’s chamber at the necessary time.</a:t>
+              <a:t>    hospital or the nearest doctor’s chamber at the necessary time.</a:t>
             </a:r>
             <a:endParaRPr lang="en-US" dirty="0"/>
           </a:p>
@@ -37112,11 +37530,7 @@
             </a:r>
             <a:r>
               <a:rPr lang="en-US" dirty="0" smtClean="0"/>
-              <a:t>Existing </a:t>
-            </a:r>
-            <a:r>
-              <a:rPr lang="en-US" dirty="0" smtClean="0"/>
-              <a:t>ap</a:t>
+              <a:t>Existing ap</a:t>
             </a:r>
             <a:r>
               <a:rPr lang="en-US" dirty="0"/>
@@ -37142,12 +37556,28 @@
             </a:r>
             <a:r>
               <a:rPr lang="en-US" dirty="0" smtClean="0"/>
-              <a:t>Increase </a:t>
+              <a:t>Increase of Broker in public hospital </a:t>
             </a:r>
+          </a:p>
+          <a:p>
+            <a:pPr lvl="0">
+              <a:buFont typeface="Wingdings" panose="05000000000000000000" pitchFamily="2" charset="2"/>
+              <a:buChar char="Ø"/>
+            </a:pPr>
             <a:r>
-              <a:rPr lang="en-US" dirty="0" smtClean="0"/>
-              <a:t>of Broker in public hospital </a:t>
+              <a:rPr lang="en-US" sz="2600" dirty="0">
+                <a:solidFill>
+                  <a:prstClr val="black"/>
+                </a:solidFill>
+              </a:rPr>
+              <a:t> Increasing patient </a:t>
             </a:r>
+          </a:p>
+          <a:p>
+            <a:pPr>
+              <a:buFont typeface="Wingdings" panose="05000000000000000000" pitchFamily="2" charset="2"/>
+              <a:buChar char="Ø"/>
+            </a:pPr>
             <a:endParaRPr lang="en-US" dirty="0"/>
           </a:p>
           <a:p>
@@ -37811,18 +38241,32 @@
             </a:pPr>
             <a:r>
               <a:rPr lang="en-US" sz="2800" dirty="0" smtClean="0"/>
-              <a:t> People can book appointment based on there location.</a:t>
+              <a:t>By </a:t>
             </a:r>
-            <a:endParaRPr lang="en-US" sz="2800" dirty="0"/>
+            <a:r>
+              <a:rPr lang="en-US" sz="2800" dirty="0"/>
+              <a:t>using this system we find nearest Doctor’s or Hospital for </a:t>
+            </a:r>
+            <a:r>
+              <a:rPr lang="en-US" sz="2800" dirty="0" smtClean="0"/>
+              <a:t> </a:t>
+            </a:r>
           </a:p>
           <a:p>
-            <a:pPr lvl="2">
-              <a:buFont typeface="Wingdings" panose="05000000000000000000" pitchFamily="2" charset="2"/>
-              <a:buChar char="Ø"/>
+            <a:pPr marL="914400" lvl="2" indent="0">
+              <a:buNone/>
             </a:pPr>
             <a:r>
               <a:rPr lang="en-US" sz="2800" dirty="0"/>
-              <a:t> By using this system we find nearest Doctor’s or Hospital for appointment. </a:t>
+              <a:t> </a:t>
+            </a:r>
+            <a:r>
+              <a:rPr lang="en-US" sz="2800" dirty="0" smtClean="0"/>
+              <a:t>   appointment</a:t>
+            </a:r>
+            <a:r>
+              <a:rPr lang="en-US" sz="2800" dirty="0"/>
+              <a:t>. </a:t>
             </a:r>
             <a:endParaRPr lang="en-US" sz="2800" dirty="0" smtClean="0"/>
           </a:p>

</xml_diff>

<commit_message>
final slide complete and final database added
</commit_message>
<xml_diff>
--- a/AppointmentSystem.pptx
+++ b/AppointmentSystem.pptx
@@ -5332,8 +5332,8 @@
       </dsp:nvSpPr>
       <dsp:spPr>
         <a:xfrm rot="16200000">
-          <a:off x="695089" y="-695089"/>
-          <a:ext cx="2490542" cy="3880721"/>
+          <a:off x="666310" y="-666310"/>
+          <a:ext cx="2548101" cy="3880721"/>
         </a:xfrm>
         <a:prstGeom prst="flowChartManualOperation">
           <a:avLst/>
@@ -5404,12 +5404,12 @@
         </a:fontRef>
       </dsp:style>
       <dsp:txBody>
-        <a:bodyPr spcFirstLastPara="0" vert="horz" wrap="square" lIns="165100" tIns="0" rIns="162719" bIns="0" numCol="1" spcCol="1270" anchor="t" anchorCtr="0">
+        <a:bodyPr spcFirstLastPara="0" vert="horz" wrap="square" lIns="171450" tIns="0" rIns="168672" bIns="0" numCol="1" spcCol="1270" anchor="t" anchorCtr="0">
           <a:noAutofit/>
         </a:bodyPr>
         <a:lstStyle/>
         <a:p>
-          <a:pPr lvl="0" algn="l" defTabSz="1155700">
+          <a:pPr lvl="0" algn="l" defTabSz="1200150">
             <a:lnSpc>
               <a:spcPct val="90000"/>
             </a:lnSpc>
@@ -5420,7 +5420,7 @@
               <a:spcPct val="35000"/>
             </a:spcAft>
           </a:pPr>
-          <a:endParaRPr lang="en-US" sz="2600" b="1" kern="1200" dirty="0">
+          <a:endParaRPr lang="en-US" sz="2700" b="1" kern="1200" dirty="0">
             <a:solidFill>
               <a:schemeClr val="tx2">
                 <a:lumMod val="50000"/>
@@ -5429,7 +5429,7 @@
           </a:endParaRPr>
         </a:p>
         <a:p>
-          <a:pPr marL="228600" lvl="1" indent="-228600" algn="l" defTabSz="889000">
+          <a:pPr marL="228600" lvl="1" indent="-228600" algn="l" defTabSz="933450">
             <a:lnSpc>
               <a:spcPct val="90000"/>
             </a:lnSpc>
@@ -5442,7 +5442,7 @@
             <a:buChar char="••"/>
           </a:pPr>
           <a:r>
-            <a:rPr lang="en-US" sz="2000" kern="1200" dirty="0" smtClean="0">
+            <a:rPr lang="en-US" sz="2100" kern="1200" dirty="0" smtClean="0">
               <a:solidFill>
                 <a:schemeClr val="tx2">
                   <a:lumMod val="50000"/>
@@ -5451,7 +5451,7 @@
             </a:rPr>
             <a:t>Reg. No 	: 13502000498</a:t>
           </a:r>
-          <a:endParaRPr lang="en-US" sz="2000" kern="1200" dirty="0">
+          <a:endParaRPr lang="en-US" sz="2100" kern="1200" dirty="0">
             <a:solidFill>
               <a:schemeClr val="tx2">
                 <a:lumMod val="50000"/>
@@ -5460,7 +5460,7 @@
           </a:endParaRPr>
         </a:p>
         <a:p>
-          <a:pPr marL="228600" lvl="1" indent="-228600" algn="l" defTabSz="889000">
+          <a:pPr marL="228600" lvl="1" indent="-228600" algn="l" defTabSz="933450">
             <a:lnSpc>
               <a:spcPct val="90000"/>
             </a:lnSpc>
@@ -5473,7 +5473,7 @@
             <a:buChar char="••"/>
           </a:pPr>
           <a:r>
-            <a:rPr lang="en-US" sz="2000" kern="1200" dirty="0" smtClean="0">
+            <a:rPr lang="en-US" sz="2100" kern="1200" dirty="0" smtClean="0">
               <a:solidFill>
                 <a:schemeClr val="tx2">
                   <a:lumMod val="50000"/>
@@ -5482,7 +5482,7 @@
             </a:rPr>
             <a:t>Session	: 2013-14</a:t>
           </a:r>
-          <a:endParaRPr lang="en-US" sz="2000" kern="1200" dirty="0">
+          <a:endParaRPr lang="en-US" sz="2100" kern="1200" dirty="0">
             <a:solidFill>
               <a:schemeClr val="tx2">
                 <a:lumMod val="50000"/>
@@ -5491,7 +5491,7 @@
           </a:endParaRPr>
         </a:p>
         <a:p>
-          <a:pPr marL="228600" lvl="1" indent="-228600" algn="l" defTabSz="889000">
+          <a:pPr marL="228600" lvl="1" indent="-228600" algn="l" defTabSz="933450">
             <a:lnSpc>
               <a:spcPct val="90000"/>
             </a:lnSpc>
@@ -5504,7 +5504,7 @@
             <a:buChar char="••"/>
           </a:pPr>
           <a:r>
-            <a:rPr lang="en-US" sz="2000" kern="1200" dirty="0" smtClean="0">
+            <a:rPr lang="en-US" sz="2100" kern="1200" dirty="0" smtClean="0">
               <a:solidFill>
                 <a:schemeClr val="tx2">
                   <a:lumMod val="50000"/>
@@ -5513,7 +5513,7 @@
             </a:rPr>
             <a:t>Class Roll 	: 1453</a:t>
           </a:r>
-          <a:endParaRPr lang="en-US" sz="2000" kern="1200" dirty="0">
+          <a:endParaRPr lang="en-US" sz="2100" kern="1200" dirty="0">
             <a:solidFill>
               <a:schemeClr val="tx2">
                 <a:lumMod val="50000"/>
@@ -5523,8 +5523,8 @@
         </a:p>
       </dsp:txBody>
       <dsp:txXfrm rot="5400000">
-        <a:off x="0" y="498108"/>
-        <a:ext cx="3880721" cy="1494326"/>
+        <a:off x="0" y="509620"/>
+        <a:ext cx="3880721" cy="1528861"/>
       </dsp:txXfrm>
     </dsp:sp>
     <dsp:sp modelId="{463F655E-44B5-4F01-8370-E8D17645B6E7}">
@@ -5534,8 +5534,8 @@
       </dsp:nvSpPr>
       <dsp:spPr>
         <a:xfrm rot="16200000">
-          <a:off x="4814672" y="-695089"/>
-          <a:ext cx="2490542" cy="3880721"/>
+          <a:off x="4785893" y="-666310"/>
+          <a:ext cx="2548101" cy="3880721"/>
         </a:xfrm>
         <a:prstGeom prst="flowChartManualOperation">
           <a:avLst/>
@@ -5606,12 +5606,12 @@
         </a:fontRef>
       </dsp:style>
       <dsp:txBody>
-        <a:bodyPr spcFirstLastPara="0" vert="horz" wrap="square" lIns="165100" tIns="0" rIns="162719" bIns="0" numCol="1" spcCol="1270" anchor="t" anchorCtr="0">
+        <a:bodyPr spcFirstLastPara="0" vert="horz" wrap="square" lIns="171450" tIns="0" rIns="168672" bIns="0" numCol="1" spcCol="1270" anchor="t" anchorCtr="0">
           <a:noAutofit/>
         </a:bodyPr>
         <a:lstStyle/>
         <a:p>
-          <a:pPr lvl="0" algn="l" defTabSz="1155700">
+          <a:pPr lvl="0" algn="l" defTabSz="1200150">
             <a:lnSpc>
               <a:spcPct val="90000"/>
             </a:lnSpc>
@@ -5622,7 +5622,7 @@
               <a:spcPct val="35000"/>
             </a:spcAft>
           </a:pPr>
-          <a:endParaRPr lang="en-US" sz="2600" b="1" kern="1200" dirty="0">
+          <a:endParaRPr lang="en-US" sz="2700" b="1" kern="1200" dirty="0">
             <a:solidFill>
               <a:schemeClr val="tx2">
                 <a:lumMod val="50000"/>
@@ -5631,7 +5631,7 @@
           </a:endParaRPr>
         </a:p>
         <a:p>
-          <a:pPr marL="228600" lvl="1" indent="-228600" algn="l" defTabSz="889000">
+          <a:pPr marL="228600" lvl="1" indent="-228600" algn="l" defTabSz="933450">
             <a:lnSpc>
               <a:spcPct val="90000"/>
             </a:lnSpc>
@@ -5644,7 +5644,7 @@
             <a:buChar char="••"/>
           </a:pPr>
           <a:r>
-            <a:rPr lang="en-US" sz="2000" kern="1200" dirty="0" smtClean="0">
+            <a:rPr lang="en-US" sz="2100" kern="1200" dirty="0" smtClean="0">
               <a:solidFill>
                 <a:schemeClr val="tx2">
                   <a:lumMod val="50000"/>
@@ -5653,7 +5653,7 @@
             </a:rPr>
             <a:t>Reg. No	: 13502000464</a:t>
           </a:r>
-          <a:endParaRPr lang="en-US" sz="2000" kern="1200" dirty="0">
+          <a:endParaRPr lang="en-US" sz="2100" kern="1200" dirty="0">
             <a:solidFill>
               <a:schemeClr val="tx2">
                 <a:lumMod val="50000"/>
@@ -5662,7 +5662,7 @@
           </a:endParaRPr>
         </a:p>
         <a:p>
-          <a:pPr marL="228600" lvl="1" indent="-228600" algn="l" defTabSz="889000">
+          <a:pPr marL="228600" lvl="1" indent="-228600" algn="l" defTabSz="933450">
             <a:lnSpc>
               <a:spcPct val="90000"/>
             </a:lnSpc>
@@ -5675,7 +5675,7 @@
             <a:buChar char="••"/>
           </a:pPr>
           <a:r>
-            <a:rPr lang="en-US" sz="2000" kern="1200" dirty="0" smtClean="0">
+            <a:rPr lang="en-US" sz="2100" kern="1200" dirty="0" smtClean="0">
               <a:solidFill>
                 <a:schemeClr val="tx2">
                   <a:lumMod val="50000"/>
@@ -5684,7 +5684,7 @@
             </a:rPr>
             <a:t>Session	: 2013-14</a:t>
           </a:r>
-          <a:endParaRPr lang="en-US" sz="2000" kern="1200" dirty="0">
+          <a:endParaRPr lang="en-US" sz="2100" kern="1200" dirty="0">
             <a:solidFill>
               <a:schemeClr val="tx2">
                 <a:lumMod val="50000"/>
@@ -5693,7 +5693,7 @@
           </a:endParaRPr>
         </a:p>
         <a:p>
-          <a:pPr marL="228600" lvl="1" indent="-228600" algn="l" defTabSz="889000">
+          <a:pPr marL="228600" lvl="1" indent="-228600" algn="l" defTabSz="933450">
             <a:lnSpc>
               <a:spcPct val="90000"/>
             </a:lnSpc>
@@ -5706,7 +5706,7 @@
             <a:buChar char="••"/>
           </a:pPr>
           <a:r>
-            <a:rPr lang="en-US" sz="2000" kern="1200" dirty="0" smtClean="0">
+            <a:rPr lang="en-US" sz="2100" kern="1200" dirty="0" smtClean="0">
               <a:solidFill>
                 <a:schemeClr val="tx2">
                   <a:lumMod val="50000"/>
@@ -5715,7 +5715,7 @@
             </a:rPr>
             <a:t>Class Roll 	: 1455</a:t>
           </a:r>
-          <a:endParaRPr lang="en-US" sz="2000" kern="1200" dirty="0">
+          <a:endParaRPr lang="en-US" sz="2100" kern="1200" dirty="0">
             <a:solidFill>
               <a:schemeClr val="tx2">
                 <a:lumMod val="50000"/>
@@ -5725,8 +5725,8 @@
         </a:p>
       </dsp:txBody>
       <dsp:txXfrm rot="5400000">
-        <a:off x="4119583" y="498108"/>
-        <a:ext cx="3880721" cy="1494326"/>
+        <a:off x="4119583" y="509620"/>
+        <a:ext cx="3880721" cy="1528861"/>
       </dsp:txXfrm>
     </dsp:sp>
   </dsp:spTree>
@@ -12796,7 +12796,7 @@
           <a:p>
             <a:fld id="{1903D2E6-90E9-4C1E-8D2C-09FDD67DF24E}" type="datetimeFigureOut">
               <a:rPr lang="en-US" smtClean="0"/>
-              <a:t>10/3/2018</a:t>
+              <a:t>10/5/2018</a:t>
             </a:fld>
             <a:endParaRPr lang="en-US"/>
           </a:p>
@@ -12961,7 +12961,7 @@
           <a:p>
             <a:fld id="{99B6A5DE-4519-49E8-8E53-ED60557F7BC8}" type="datetimeFigureOut">
               <a:rPr lang="en-US" smtClean="0"/>
-              <a:t>10/3/2018</a:t>
+              <a:t>10/5/2018</a:t>
             </a:fld>
             <a:endParaRPr lang="en-US"/>
           </a:p>
@@ -13449,7 +13449,7 @@
           <a:p>
             <a:fld id="{0C14835E-303F-459C-BC65-145C3C30866C}" type="datetime1">
               <a:rPr lang="en-US" smtClean="0"/>
-              <a:t>10/3/2018</a:t>
+              <a:t>10/5/2018</a:t>
             </a:fld>
             <a:endParaRPr lang="en-US"/>
           </a:p>
@@ -13634,7 +13634,7 @@
           <a:p>
             <a:fld id="{3FFE7F95-A669-4F9F-A2E7-9D731A7C1B38}" type="datetime1">
               <a:rPr lang="en-US" smtClean="0"/>
-              <a:t>10/3/2018</a:t>
+              <a:t>10/5/2018</a:t>
             </a:fld>
             <a:endParaRPr lang="en-US"/>
           </a:p>
@@ -13822,7 +13822,7 @@
           <a:p>
             <a:fld id="{3FFE7F95-A669-4F9F-A2E7-9D731A7C1B38}" type="datetime1">
               <a:rPr lang="en-US" smtClean="0"/>
-              <a:t>10/3/2018</a:t>
+              <a:t>10/5/2018</a:t>
             </a:fld>
             <a:endParaRPr lang="en-US"/>
           </a:p>
@@ -14000,7 +14000,7 @@
           <a:p>
             <a:fld id="{3FFE7F95-A669-4F9F-A2E7-9D731A7C1B38}" type="datetime1">
               <a:rPr lang="en-US" smtClean="0"/>
-              <a:t>10/3/2018</a:t>
+              <a:t>10/5/2018</a:t>
             </a:fld>
             <a:endParaRPr lang="en-US"/>
           </a:p>
@@ -14254,7 +14254,7 @@
           <a:p>
             <a:fld id="{08F70EB8-2FE7-4990-B349-1DEDBA1E9B98}" type="datetime1">
               <a:rPr lang="en-US" smtClean="0"/>
-              <a:t>10/3/2018</a:t>
+              <a:t>10/5/2018</a:t>
             </a:fld>
             <a:endParaRPr lang="en-US"/>
           </a:p>
@@ -14496,7 +14496,7 @@
           <a:p>
             <a:fld id="{3FFE7F95-A669-4F9F-A2E7-9D731A7C1B38}" type="datetime1">
               <a:rPr lang="en-US" smtClean="0"/>
-              <a:t>10/3/2018</a:t>
+              <a:t>10/5/2018</a:t>
             </a:fld>
             <a:endParaRPr lang="en-US"/>
           </a:p>
@@ -14871,7 +14871,7 @@
           <a:p>
             <a:fld id="{3FFE7F95-A669-4F9F-A2E7-9D731A7C1B38}" type="datetime1">
               <a:rPr lang="en-US" smtClean="0"/>
-              <a:t>10/3/2018</a:t>
+              <a:t>10/5/2018</a:t>
             </a:fld>
             <a:endParaRPr lang="en-US"/>
           </a:p>
@@ -14997,7 +14997,7 @@
           <a:p>
             <a:fld id="{1F507480-5BD6-4787-B240-F5A4CF87D70F}" type="datetime1">
               <a:rPr lang="en-US" smtClean="0"/>
-              <a:t>10/3/2018</a:t>
+              <a:t>10/5/2018</a:t>
             </a:fld>
             <a:endParaRPr lang="en-US"/>
           </a:p>
@@ -15102,7 +15102,7 @@
           <a:p>
             <a:fld id="{0E51A436-DA71-401E-A9B1-6F9D660F239A}" type="datetime1">
               <a:rPr lang="en-US" smtClean="0"/>
-              <a:t>10/3/2018</a:t>
+              <a:t>10/5/2018</a:t>
             </a:fld>
             <a:endParaRPr lang="en-US"/>
           </a:p>
@@ -15394,7 +15394,7 @@
           <a:p>
             <a:fld id="{3FFE7F95-A669-4F9F-A2E7-9D731A7C1B38}" type="datetime1">
               <a:rPr lang="en-US" smtClean="0"/>
-              <a:t>10/3/2018</a:t>
+              <a:t>10/5/2018</a:t>
             </a:fld>
             <a:endParaRPr lang="en-US"/>
           </a:p>
@@ -15659,7 +15659,7 @@
           <a:p>
             <a:fld id="{D6550592-60A0-40DE-BEF2-D850CCF7BB85}" type="datetime1">
               <a:rPr lang="en-US" smtClean="0"/>
-              <a:t>10/3/2018</a:t>
+              <a:t>10/5/2018</a:t>
             </a:fld>
             <a:endParaRPr lang="en-US"/>
           </a:p>
@@ -15882,7 +15882,7 @@
           <a:p>
             <a:fld id="{3FFE7F95-A669-4F9F-A2E7-9D731A7C1B38}" type="datetime1">
               <a:rPr lang="en-US" smtClean="0"/>
-              <a:t>10/3/2018</a:t>
+              <a:t>10/5/2018</a:t>
             </a:fld>
             <a:endParaRPr lang="en-US"/>
           </a:p>
@@ -16589,14 +16589,14 @@
           <p:nvPr>
             <p:extLst>
               <p:ext uri="{D42A27DB-BD31-4B8C-83A1-F6EECF244321}">
-                <p14:modId xmlns:p14="http://schemas.microsoft.com/office/powerpoint/2010/main" val="1050024530"/>
+                <p14:modId xmlns:p14="http://schemas.microsoft.com/office/powerpoint/2010/main" val="998491767"/>
               </p:ext>
             </p:extLst>
           </p:nvPr>
         </p:nvGraphicFramePr>
         <p:xfrm>
-          <a:off x="2274181" y="3726733"/>
-          <a:ext cx="8060565" cy="2490543"/>
+          <a:off x="2274181" y="3669175"/>
+          <a:ext cx="8060565" cy="2548101"/>
         </p:xfrm>
         <a:graphic>
           <a:graphicData uri="http://schemas.openxmlformats.org/drawingml/2006/diagram">
@@ -17161,7 +17161,7 @@
         </p:nvSpPr>
         <p:spPr>
           <a:xfrm>
-            <a:off x="2111499" y="1681400"/>
+            <a:off x="1354160" y="1734137"/>
             <a:ext cx="9592772" cy="3651504"/>
           </a:xfrm>
           <a:noFill/>
@@ -17193,7 +17193,7 @@
         </p:nvSpPr>
         <p:spPr>
           <a:xfrm>
-            <a:off x="4038600" y="5880838"/>
+            <a:off x="3737650" y="5880838"/>
             <a:ext cx="4114800" cy="356910"/>
           </a:xfrm>
         </p:spPr>
@@ -17243,7 +17243,7 @@
         </p:nvSpPr>
         <p:spPr>
           <a:xfrm>
-            <a:off x="5244794" y="2899651"/>
+            <a:off x="4943844" y="2899651"/>
             <a:ext cx="2345139" cy="1152755"/>
           </a:xfrm>
           <a:prstGeom prst="roundRect">
@@ -17317,7 +17317,7 @@
         </p:nvSpPr>
         <p:spPr>
           <a:xfrm>
-            <a:off x="2112065" y="2288259"/>
+            <a:off x="1811115" y="2288259"/>
             <a:ext cx="1610435" cy="914400"/>
           </a:xfrm>
           <a:prstGeom prst="rect">
@@ -17380,7 +17380,7 @@
         </p:nvSpPr>
         <p:spPr>
           <a:xfrm>
-            <a:off x="2111499" y="3659859"/>
+            <a:off x="1810549" y="3659859"/>
             <a:ext cx="1610435" cy="914400"/>
           </a:xfrm>
           <a:prstGeom prst="rect">
@@ -17438,7 +17438,7 @@
         </p:nvSpPr>
         <p:spPr>
           <a:xfrm>
-            <a:off x="9112233" y="2520444"/>
+            <a:off x="8811283" y="2520444"/>
             <a:ext cx="1834699" cy="744425"/>
           </a:xfrm>
           <a:prstGeom prst="rect">
@@ -17501,7 +17501,7 @@
         </p:nvSpPr>
         <p:spPr>
           <a:xfrm>
-            <a:off x="9112238" y="3670506"/>
+            <a:off x="8811288" y="3670506"/>
             <a:ext cx="1834700" cy="744425"/>
           </a:xfrm>
           <a:prstGeom prst="rect">
@@ -17559,7 +17559,7 @@
         </p:nvSpPr>
         <p:spPr>
           <a:xfrm>
-            <a:off x="5407432" y="5211867"/>
+            <a:off x="5106482" y="5211867"/>
             <a:ext cx="2019869" cy="465603"/>
           </a:xfrm>
           <a:prstGeom prst="rect">
@@ -17619,8 +17619,8 @@
         </p:nvSpPr>
         <p:spPr>
           <a:xfrm>
-            <a:off x="5244803" y="5220136"/>
-            <a:ext cx="289447" cy="450856"/>
+            <a:off x="4943853" y="5208560"/>
+            <a:ext cx="289447" cy="468909"/>
           </a:xfrm>
           <a:prstGeom prst="rect">
             <a:avLst/>
@@ -17675,7 +17675,7 @@
         </p:nvSpPr>
         <p:spPr>
           <a:xfrm flipH="1">
-            <a:off x="7427300" y="5203599"/>
+            <a:off x="7126350" y="5203599"/>
             <a:ext cx="139733" cy="450856"/>
           </a:xfrm>
           <a:prstGeom prst="rect">
@@ -17730,7 +17730,7 @@
         </p:nvCxnSpPr>
         <p:spPr>
           <a:xfrm>
-            <a:off x="3722500" y="2745459"/>
+            <a:off x="3421550" y="2745459"/>
             <a:ext cx="1522864" cy="457200"/>
           </a:xfrm>
           <a:prstGeom prst="straightConnector1">
@@ -17768,7 +17768,7 @@
         </p:nvCxnSpPr>
         <p:spPr>
           <a:xfrm flipV="1">
-            <a:off x="3721933" y="3750593"/>
+            <a:off x="3420983" y="3750593"/>
             <a:ext cx="1522864" cy="366467"/>
           </a:xfrm>
           <a:prstGeom prst="straightConnector1">
@@ -17806,7 +17806,7 @@
         </p:nvCxnSpPr>
         <p:spPr>
           <a:xfrm>
-            <a:off x="7589936" y="3670500"/>
+            <a:off x="7288986" y="3670500"/>
             <a:ext cx="1522296" cy="372213"/>
           </a:xfrm>
           <a:prstGeom prst="straightConnector1">
@@ -17844,7 +17844,7 @@
         </p:nvCxnSpPr>
         <p:spPr>
           <a:xfrm flipV="1">
-            <a:off x="7589936" y="2892657"/>
+            <a:off x="7288986" y="2892657"/>
             <a:ext cx="1522296" cy="372212"/>
           </a:xfrm>
           <a:prstGeom prst="straightConnector1">
@@ -17883,7 +17883,7 @@
         </p:nvCxnSpPr>
         <p:spPr>
           <a:xfrm>
-            <a:off x="6417364" y="4052406"/>
+            <a:off x="6116414" y="4052406"/>
             <a:ext cx="3" cy="1159461"/>
           </a:xfrm>
           <a:prstGeom prst="straightConnector1">
@@ -24519,10 +24519,13 @@
                     <a:lumMod val="50000"/>
                   </a:schemeClr>
                 </a:solidFill>
+                <a:latin typeface="+mn-lt"/>
               </a:rPr>
               <a:t>Features Comparison Table</a:t>
             </a:r>
-            <a:endParaRPr lang="en-US" dirty="0"/>
+            <a:endParaRPr lang="en-US" dirty="0">
+              <a:latin typeface="+mn-lt"/>
+            </a:endParaRPr>
           </a:p>
         </p:txBody>
       </p:sp>
@@ -26879,10 +26882,13 @@
                     <a:lumMod val="50000"/>
                   </a:schemeClr>
                 </a:solidFill>
+                <a:latin typeface="+mn-lt"/>
               </a:rPr>
               <a:t>Appointment Booking Page</a:t>
             </a:r>
-            <a:endParaRPr lang="en-US" dirty="0"/>
+            <a:endParaRPr lang="en-US" dirty="0">
+              <a:latin typeface="+mn-lt"/>
+            </a:endParaRPr>
           </a:p>
         </p:txBody>
       </p:sp>
@@ -26930,7 +26936,7 @@
       </p:sp>
       <p:pic>
         <p:nvPicPr>
-          <p:cNvPr id="6" name="Picture 5"/>
+          <p:cNvPr id="3" name="Picture 2"/>
           <p:cNvPicPr>
             <a:picLocks noChangeAspect="1"/>
           </p:cNvPicPr>
@@ -26950,8 +26956,8 @@
         </p:blipFill>
         <p:spPr>
           <a:xfrm>
-            <a:off x="1312761" y="1690688"/>
-            <a:ext cx="9116027" cy="4939120"/>
+            <a:off x="838200" y="1309612"/>
+            <a:ext cx="10058400" cy="5655088"/>
           </a:xfrm>
           <a:prstGeom prst="rect">
             <a:avLst/>
@@ -27291,6 +27297,7 @@
                     <a:lumMod val="50000"/>
                   </a:schemeClr>
                 </a:solidFill>
+                <a:latin typeface="+mn-lt"/>
               </a:rPr>
               <a:t>Testing </a:t>
             </a:r>
@@ -27301,6 +27308,7 @@
                     <a:lumMod val="50000"/>
                   </a:schemeClr>
                 </a:solidFill>
+                <a:latin typeface="+mn-lt"/>
               </a:rPr>
               <a:t>(</a:t>
             </a:r>
@@ -27311,6 +27319,7 @@
                     <a:lumMod val="50000"/>
                   </a:schemeClr>
                 </a:solidFill>
+                <a:latin typeface="+mn-lt"/>
               </a:rPr>
               <a:t>Test Case</a:t>
             </a:r>
@@ -27321,10 +27330,13 @@
                     <a:lumMod val="50000"/>
                   </a:schemeClr>
                 </a:solidFill>
+                <a:latin typeface="+mn-lt"/>
               </a:rPr>
               <a:t>)</a:t>
             </a:r>
-            <a:endParaRPr lang="en-US" dirty="0"/>
+            <a:endParaRPr lang="en-US" dirty="0">
+              <a:latin typeface="+mn-lt"/>
+            </a:endParaRPr>
           </a:p>
         </p:txBody>
       </p:sp>
@@ -29010,10 +29022,13 @@
                     <a:lumMod val="50000"/>
                   </a:schemeClr>
                 </a:solidFill>
+                <a:latin typeface="+mn-lt"/>
               </a:rPr>
               <a:t>Check Database Connection</a:t>
             </a:r>
-            <a:endParaRPr lang="en-US" dirty="0"/>
+            <a:endParaRPr lang="en-US" dirty="0">
+              <a:latin typeface="+mn-lt"/>
+            </a:endParaRPr>
           </a:p>
         </p:txBody>
       </p:sp>
@@ -30738,6 +30753,7 @@
                     <a:lumMod val="50000"/>
                   </a:schemeClr>
                 </a:solidFill>
+                <a:latin typeface="+mn-lt"/>
               </a:rPr>
               <a:t>Check </a:t>
             </a:r>
@@ -30748,6 +30764,7 @@
                     <a:lumMod val="50000"/>
                   </a:schemeClr>
                 </a:solidFill>
+                <a:latin typeface="+mn-lt"/>
               </a:rPr>
               <a:t>Patient </a:t>
             </a:r>
@@ -30758,10 +30775,13 @@
                     <a:lumMod val="50000"/>
                   </a:schemeClr>
                 </a:solidFill>
+                <a:latin typeface="+mn-lt"/>
               </a:rPr>
               <a:t>Registration Form</a:t>
             </a:r>
-            <a:endParaRPr lang="en-US" dirty="0"/>
+            <a:endParaRPr lang="en-US" dirty="0">
+              <a:latin typeface="+mn-lt"/>
+            </a:endParaRPr>
           </a:p>
         </p:txBody>
       </p:sp>
@@ -32454,6 +32474,7 @@
                     <a:lumMod val="50000"/>
                   </a:schemeClr>
                 </a:solidFill>
+                <a:latin typeface="+mn-lt"/>
               </a:rPr>
               <a:t>Check </a:t>
             </a:r>
@@ -32464,6 +32485,7 @@
                     <a:lumMod val="50000"/>
                   </a:schemeClr>
                 </a:solidFill>
+                <a:latin typeface="+mn-lt"/>
               </a:rPr>
               <a:t>Doctor </a:t>
             </a:r>
@@ -32474,10 +32496,13 @@
                     <a:lumMod val="50000"/>
                   </a:schemeClr>
                 </a:solidFill>
+                <a:latin typeface="+mn-lt"/>
               </a:rPr>
               <a:t>Registration Form</a:t>
             </a:r>
-            <a:endParaRPr lang="en-US" dirty="0"/>
+            <a:endParaRPr lang="en-US" dirty="0">
+              <a:latin typeface="+mn-lt"/>
+            </a:endParaRPr>
           </a:p>
         </p:txBody>
       </p:sp>
@@ -34135,6 +34160,7 @@
                     <a:lumMod val="50000"/>
                   </a:schemeClr>
                 </a:solidFill>
+                <a:latin typeface="+mn-lt"/>
               </a:rPr>
               <a:t>Check </a:t>
             </a:r>
@@ -34145,10 +34171,13 @@
                     <a:lumMod val="50000"/>
                   </a:schemeClr>
                 </a:solidFill>
+                <a:latin typeface="+mn-lt"/>
               </a:rPr>
               <a:t>Patient &amp; Doctor Login Credentials</a:t>
             </a:r>
-            <a:endParaRPr lang="en-US" dirty="0"/>
+            <a:endParaRPr lang="en-US" dirty="0">
+              <a:latin typeface="+mn-lt"/>
+            </a:endParaRPr>
           </a:p>
         </p:txBody>
       </p:sp>
@@ -35514,6 +35543,7 @@
                     <a:lumMod val="50000"/>
                   </a:schemeClr>
                 </a:solidFill>
+                <a:latin typeface="+mn-lt"/>
               </a:rPr>
               <a:t>Check </a:t>
             </a:r>
@@ -35524,10 +35554,13 @@
                     <a:lumMod val="50000"/>
                   </a:schemeClr>
                 </a:solidFill>
+                <a:latin typeface="+mn-lt"/>
               </a:rPr>
               <a:t>Admin Login Credentials</a:t>
             </a:r>
-            <a:endParaRPr lang="en-US" dirty="0"/>
+            <a:endParaRPr lang="en-US" dirty="0">
+              <a:latin typeface="+mn-lt"/>
+            </a:endParaRPr>
           </a:p>
         </p:txBody>
       </p:sp>
@@ -37103,11 +37136,7 @@
             </a:pPr>
             <a:r>
               <a:rPr lang="en-US" sz="2800" dirty="0" smtClean="0"/>
-              <a:t> This system is develop across in our country</a:t>
-            </a:r>
-            <a:r>
-              <a:rPr lang="en-US" sz="2800" dirty="0" smtClean="0"/>
-              <a:t>.</a:t>
+              <a:t> This system is develop across in our country.</a:t>
             </a:r>
           </a:p>
           <a:p>
@@ -37117,11 +37146,7 @@
             </a:pPr>
             <a:r>
               <a:rPr lang="en-US" sz="2800" dirty="0" smtClean="0"/>
-              <a:t> Future Work </a:t>
-            </a:r>
-            <a:r>
-              <a:rPr lang="en-US" sz="2800" dirty="0" smtClean="0"/>
-              <a:t> </a:t>
+              <a:t> Future Work  </a:t>
             </a:r>
           </a:p>
           <a:p>

</xml_diff>